<commit_message>
word and picture is put into the ppt according to the template for word flicker
</commit_message>
<xml_diff>
--- a/template_for_word_flicker.pptx
+++ b/template_for_word_flicker.pptx
@@ -4,10 +4,6 @@
   <p:sldMasterIdLst>
     <p:sldMasterId id="2147483648" r:id="rId1"/>
   </p:sldMasterIdLst>
-  <p:sldIdLst>
-    <p:sldId id="256" r:id="rId2"/>
-    <p:sldId id="257" r:id="rId3"/>
-  </p:sldIdLst>
   <p:sldSz cx="12192000" cy="6858000"/>
   <p:notesSz cx="6858000" cy="9144000"/>
   <p:defaultTextStyle>
@@ -245,8 +241,8 @@
   <p:clrMapOvr>
     <a:overrideClrMapping bg1="dk1" tx1="lt1" bg2="dk2" tx2="lt2" accent1="accent1" accent2="accent2" accent3="accent3" accent4="accent4" accent5="accent5" accent6="accent6" hlink="hlink" folHlink="folHlink"/>
   </p:clrMapOvr>
-  <mc:AlternateContent xmlns:mc="http://schemas.openxmlformats.org/markup-compatibility/2006">
-    <mc:Choice xmlns:p14="http://schemas.microsoft.com/office/powerpoint/2010/main" Requires="p14">
+  <mc:AlternateContent xmlns:mc="http://schemas.openxmlformats.org/markup-compatibility/2006" xmlns:p14="http://schemas.microsoft.com/office/powerpoint/2010/main">
+    <mc:Choice Requires="p14">
       <p:transition spd="med" p14:dur="700" advClick="0" advTm="1000">
         <p:fade/>
         <p:sndAc>
@@ -256,12 +252,12 @@
         </p:sndAc>
       </p:transition>
     </mc:Choice>
-    <mc:Fallback>
+    <mc:Fallback xmlns="">
       <p:transition spd="med" advClick="0" advTm="1000">
         <p:fade/>
         <p:sndAc>
           <p:stSnd>
-            <p:snd r:embed="rId1" name="whoosh.wav"/>
+            <p:snd r:embed="rId3" name="whoosh.wav"/>
           </p:stSnd>
         </p:sndAc>
       </p:transition>
@@ -414,8 +410,8 @@
   <p:clrMapOvr>
     <a:overrideClrMapping bg1="dk1" tx1="lt1" bg2="dk2" tx2="lt2" accent1="accent1" accent2="accent2" accent3="accent3" accent4="accent4" accent5="accent5" accent6="accent6" hlink="hlink" folHlink="folHlink"/>
   </p:clrMapOvr>
-  <mc:AlternateContent xmlns:mc="http://schemas.openxmlformats.org/markup-compatibility/2006">
-    <mc:Choice xmlns:p14="http://schemas.microsoft.com/office/powerpoint/2010/main" Requires="p14">
+  <mc:AlternateContent xmlns:mc="http://schemas.openxmlformats.org/markup-compatibility/2006" xmlns:p14="http://schemas.microsoft.com/office/powerpoint/2010/main">
+    <mc:Choice Requires="p14">
       <p:transition spd="med" p14:dur="700" advClick="0" advTm="1000">
         <p:fade/>
         <p:sndAc>
@@ -425,12 +421,12 @@
         </p:sndAc>
       </p:transition>
     </mc:Choice>
-    <mc:Fallback>
+    <mc:Fallback xmlns="">
       <p:transition spd="med" advClick="0" advTm="1000">
         <p:fade/>
         <p:sndAc>
           <p:stSnd>
-            <p:snd r:embed="rId1" name="whoosh.wav"/>
+            <p:snd r:embed="rId3" name="whoosh.wav"/>
           </p:stSnd>
         </p:sndAc>
       </p:transition>
@@ -541,8 +537,8 @@
   <p:clrMapOvr>
     <a:overrideClrMapping bg1="dk1" tx1="lt1" bg2="dk2" tx2="lt2" accent1="accent1" accent2="accent2" accent3="accent3" accent4="accent4" accent5="accent5" accent6="accent6" hlink="hlink" folHlink="folHlink"/>
   </p:clrMapOvr>
-  <mc:AlternateContent xmlns:mc="http://schemas.openxmlformats.org/markup-compatibility/2006">
-    <mc:Choice xmlns:p14="http://schemas.microsoft.com/office/powerpoint/2010/main" Requires="p14">
+  <mc:AlternateContent xmlns:mc="http://schemas.openxmlformats.org/markup-compatibility/2006" xmlns:p14="http://schemas.microsoft.com/office/powerpoint/2010/main">
+    <mc:Choice Requires="p14">
       <p:transition spd="med" p14:dur="700" advClick="0" advTm="1000">
         <p:fade/>
         <p:sndAc>
@@ -552,12 +548,12 @@
         </p:sndAc>
       </p:transition>
     </mc:Choice>
-    <mc:Fallback>
+    <mc:Fallback xmlns="">
       <p:transition spd="med" advClick="0" advTm="1000">
         <p:fade/>
         <p:sndAc>
           <p:stSnd>
-            <p:snd r:embed="rId1" name="whoosh.wav"/>
+            <p:snd r:embed="rId3" name="whoosh.wav"/>
           </p:stSnd>
         </p:sndAc>
       </p:transition>
@@ -628,8 +624,8 @@
   <p:clrMapOvr>
     <a:overrideClrMapping bg1="dk1" tx1="lt1" bg2="dk2" tx2="lt2" accent1="accent1" accent2="accent2" accent3="accent3" accent4="accent4" accent5="accent5" accent6="accent6" hlink="hlink" folHlink="folHlink"/>
   </p:clrMapOvr>
-  <mc:AlternateContent xmlns:mc="http://schemas.openxmlformats.org/markup-compatibility/2006">
-    <mc:Choice xmlns:p14="http://schemas.microsoft.com/office/powerpoint/2010/main" Requires="p14">
+  <mc:AlternateContent xmlns:mc="http://schemas.openxmlformats.org/markup-compatibility/2006" xmlns:p14="http://schemas.microsoft.com/office/powerpoint/2010/main">
+    <mc:Choice Requires="p14">
       <p:transition spd="med" p14:dur="700" advClick="0" advTm="1000">
         <p:fade/>
         <p:sndAc>
@@ -639,12 +635,12 @@
         </p:sndAc>
       </p:transition>
     </mc:Choice>
-    <mc:Fallback>
+    <mc:Fallback xmlns="">
       <p:transition spd="med" advClick="0" advTm="1000">
         <p:fade/>
         <p:sndAc>
           <p:stSnd>
-            <p:snd r:embed="rId1" name="whoosh.wav"/>
+            <p:snd r:embed="rId3" name="whoosh.wav"/>
           </p:stSnd>
         </p:sndAc>
       </p:transition>
@@ -727,8 +723,8 @@
   <p:clrMapOvr>
     <a:overrideClrMapping bg1="dk1" tx1="lt1" bg2="dk2" tx2="lt2" accent1="accent1" accent2="accent2" accent3="accent3" accent4="accent4" accent5="accent5" accent6="accent6" hlink="hlink" folHlink="folHlink"/>
   </p:clrMapOvr>
-  <mc:AlternateContent xmlns:mc="http://schemas.openxmlformats.org/markup-compatibility/2006">
-    <mc:Choice xmlns:p14="http://schemas.microsoft.com/office/powerpoint/2010/main" Requires="p14">
+  <mc:AlternateContent xmlns:mc="http://schemas.openxmlformats.org/markup-compatibility/2006" xmlns:p14="http://schemas.microsoft.com/office/powerpoint/2010/main">
+    <mc:Choice Requires="p14">
       <p:transition spd="med" p14:dur="700" advClick="0" advTm="1000">
         <p:fade/>
         <p:sndAc>
@@ -738,12 +734,12 @@
         </p:sndAc>
       </p:transition>
     </mc:Choice>
-    <mc:Fallback>
+    <mc:Fallback xmlns="">
       <p:transition spd="med" advClick="0" advTm="1000">
         <p:fade/>
         <p:sndAc>
           <p:stSnd>
-            <p:snd r:embed="rId1" name="whoosh.wav"/>
+            <p:snd r:embed="rId3" name="whoosh.wav"/>
           </p:stSnd>
         </p:sndAc>
       </p:transition>
@@ -972,7 +968,7 @@
           <a:p>
             <a:fld id="{D880F4F0-8576-44C0-8B5A-9ED4C3446C61}" type="datetimeFigureOut">
               <a:rPr lang="ko-KR" altLang="en-US" smtClean="0"/>
-              <a:t>2018. 9. 18.</a:t>
+              <a:t>2018. 9. 20.</a:t>
             </a:fld>
             <a:endParaRPr lang="ko-KR" altLang="en-US"/>
           </a:p>
@@ -1387,178 +1383,6 @@
     </p:otherStyle>
   </p:txStyles>
 </p:sldMaster>
-</file>
-
-<file path=ppt/slides/slide1.xml><?xml version="1.0" encoding="utf-8"?>
-<p:sld xmlns:a="http://schemas.openxmlformats.org/drawingml/2006/main" xmlns:r="http://schemas.openxmlformats.org/officeDocument/2006/relationships" xmlns:p="http://schemas.openxmlformats.org/presentationml/2006/main">
-  <p:cSld>
-    <p:spTree>
-      <p:nvGrpSpPr>
-        <p:cNvPr id="1" name=""/>
-        <p:cNvGrpSpPr/>
-        <p:nvPr/>
-      </p:nvGrpSpPr>
-      <p:grpSpPr>
-        <a:xfrm>
-          <a:off x="0" y="0"/>
-          <a:ext cx="0" cy="0"/>
-          <a:chOff x="0" y="0"/>
-          <a:chExt cx="0" cy="0"/>
-        </a:xfrm>
-      </p:grpSpPr>
-      <p:sp>
-        <p:nvSpPr>
-          <p:cNvPr id="2" name="텍스트 개체 틀 1">
-            <a:extLst>
-              <a:ext uri="{FF2B5EF4-FFF2-40B4-BE49-F238E27FC236}">
-                <a16:creationId xmlns:a16="http://schemas.microsoft.com/office/drawing/2014/main" id="{D556484A-39B9-4784-A1A1-4B89D5E4216F}"/>
-              </a:ext>
-            </a:extLst>
-          </p:cNvPr>
-          <p:cNvSpPr>
-            <a:spLocks noGrp="1"/>
-          </p:cNvSpPr>
-          <p:nvPr>
-            <p:ph type="body" sz="quarter" idx="10"/>
-          </p:nvPr>
-        </p:nvSpPr>
-        <p:spPr/>
-        <p:txBody>
-          <a:bodyPr/>
-          <a:lstStyle/>
-          <a:p>
-            <a:endParaRPr lang="ko-KR" altLang="en-US"/>
-          </a:p>
-        </p:txBody>
-      </p:sp>
-      <p:sp>
-        <p:nvSpPr>
-          <p:cNvPr id="3" name="그림 개체 틀 2">
-            <a:extLst>
-              <a:ext uri="{FF2B5EF4-FFF2-40B4-BE49-F238E27FC236}">
-                <a16:creationId xmlns:a16="http://schemas.microsoft.com/office/drawing/2014/main" id="{58351226-B1E9-4273-B8C2-0F8C2E8CEDAF}"/>
-              </a:ext>
-            </a:extLst>
-          </p:cNvPr>
-          <p:cNvSpPr>
-            <a:spLocks noGrp="1"/>
-          </p:cNvSpPr>
-          <p:nvPr>
-            <p:ph type="pic" sz="quarter" idx="11"/>
-          </p:nvPr>
-        </p:nvSpPr>
-        <p:spPr/>
-      </p:sp>
-    </p:spTree>
-    <p:extLst>
-      <p:ext uri="{BB962C8B-B14F-4D97-AF65-F5344CB8AC3E}">
-        <p14:creationId xmlns:p14="http://schemas.microsoft.com/office/powerpoint/2010/main" val="1682987281"/>
-      </p:ext>
-    </p:extLst>
-  </p:cSld>
-  <p:clrMapOvr>
-    <a:masterClrMapping/>
-  </p:clrMapOvr>
-  <mc:AlternateContent xmlns:mc="http://schemas.openxmlformats.org/markup-compatibility/2006">
-    <mc:Choice xmlns:p14="http://schemas.microsoft.com/office/powerpoint/2010/main" Requires="p14">
-      <p:transition spd="med" p14:dur="700" advClick="0" advTm="1000">
-        <p:fade/>
-        <p:sndAc>
-          <p:stSnd>
-            <p:snd r:embed="rId2" name="whoosh.wav"/>
-          </p:stSnd>
-        </p:sndAc>
-      </p:transition>
-    </mc:Choice>
-    <mc:Fallback>
-      <p:transition spd="med" advClick="0" advTm="1000">
-        <p:fade/>
-        <p:sndAc>
-          <p:stSnd>
-            <p:snd r:embed="rId2" name="whoosh.wav"/>
-          </p:stSnd>
-        </p:sndAc>
-      </p:transition>
-    </mc:Fallback>
-  </mc:AlternateContent>
-</p:sld>
-</file>
-
-<file path=ppt/slides/slide2.xml><?xml version="1.0" encoding="utf-8"?>
-<p:sld xmlns:a="http://schemas.openxmlformats.org/drawingml/2006/main" xmlns:r="http://schemas.openxmlformats.org/officeDocument/2006/relationships" xmlns:p="http://schemas.openxmlformats.org/presentationml/2006/main">
-  <p:cSld>
-    <p:spTree>
-      <p:nvGrpSpPr>
-        <p:cNvPr id="1" name=""/>
-        <p:cNvGrpSpPr/>
-        <p:nvPr/>
-      </p:nvGrpSpPr>
-      <p:grpSpPr>
-        <a:xfrm>
-          <a:off x="0" y="0"/>
-          <a:ext cx="0" cy="0"/>
-          <a:chOff x="0" y="0"/>
-          <a:chExt cx="0" cy="0"/>
-        </a:xfrm>
-      </p:grpSpPr>
-      <p:sp>
-        <p:nvSpPr>
-          <p:cNvPr id="2" name="텍스트 개체 틀 1">
-            <a:extLst>
-              <a:ext uri="{FF2B5EF4-FFF2-40B4-BE49-F238E27FC236}">
-                <a16:creationId xmlns:a16="http://schemas.microsoft.com/office/drawing/2014/main" id="{51773EF6-C4D5-4135-AE16-D692C458A43C}"/>
-              </a:ext>
-            </a:extLst>
-          </p:cNvPr>
-          <p:cNvSpPr>
-            <a:spLocks noGrp="1"/>
-          </p:cNvSpPr>
-          <p:nvPr>
-            <p:ph type="body" sz="quarter" idx="10"/>
-          </p:nvPr>
-        </p:nvSpPr>
-        <p:spPr/>
-        <p:txBody>
-          <a:bodyPr/>
-          <a:lstStyle/>
-          <a:p>
-            <a:endParaRPr lang="ko-KR" altLang="en-US"/>
-          </a:p>
-        </p:txBody>
-      </p:sp>
-    </p:spTree>
-    <p:extLst>
-      <p:ext uri="{BB962C8B-B14F-4D97-AF65-F5344CB8AC3E}">
-        <p14:creationId xmlns:p14="http://schemas.microsoft.com/office/powerpoint/2010/main" val="1897267846"/>
-      </p:ext>
-    </p:extLst>
-  </p:cSld>
-  <p:clrMapOvr>
-    <a:masterClrMapping/>
-  </p:clrMapOvr>
-  <mc:AlternateContent xmlns:mc="http://schemas.openxmlformats.org/markup-compatibility/2006">
-    <mc:Choice xmlns:p14="http://schemas.microsoft.com/office/powerpoint/2010/main" Requires="p14">
-      <p:transition spd="med" p14:dur="700" advClick="0" advTm="1000">
-        <p:fade/>
-        <p:sndAc>
-          <p:stSnd>
-            <p:snd r:embed="rId2" name="whoosh.wav"/>
-          </p:stSnd>
-        </p:sndAc>
-      </p:transition>
-    </mc:Choice>
-    <mc:Fallback>
-      <p:transition spd="med" advClick="0" advTm="1000">
-        <p:fade/>
-        <p:sndAc>
-          <p:stSnd>
-            <p:snd r:embed="rId2" name="whoosh.wav"/>
-          </p:stSnd>
-        </p:sndAc>
-      </p:transition>
-    </mc:Fallback>
-  </mc:AlternateContent>
-</p:sld>
 </file>
 
 <file path=ppt/theme/theme1.xml><?xml version="1.0" encoding="utf-8"?>

</xml_diff>

<commit_message>
changes to flicker template ppt edited ui of flicker maker
</commit_message>
<xml_diff>
--- a/template_for_word_flicker.pptx
+++ b/template_for_word_flicker.pptx
@@ -4,6 +4,9 @@
   <p:sldMasterIdLst>
     <p:sldMasterId id="2147483648" r:id="rId1"/>
   </p:sldMasterIdLst>
+  <p:sldIdLst>
+    <p:sldId id="289" r:id="rId2"/>
+  </p:sldIdLst>
   <p:sldSz cx="12192000" cy="6858000"/>
   <p:notesSz cx="6858000" cy="9144000"/>
   <p:defaultTextStyle>
@@ -133,10 +136,40 @@
       </p:grpSpPr>
       <p:sp>
         <p:nvSpPr>
+          <p:cNvPr id="6" name="그림 개체 틀 5">
+            <a:extLst>
+              <a:ext uri="{FF2B5EF4-FFF2-40B4-BE49-F238E27FC236}">
+                <a16:creationId xmlns:a16="http://schemas.microsoft.com/office/drawing/2014/main" id="{06EBFD36-46A8-49FB-A5E3-19811D4CF073}"/>
+              </a:ext>
+            </a:extLst>
+          </p:cNvPr>
+          <p:cNvSpPr>
+            <a:spLocks noGrp="1"/>
+          </p:cNvSpPr>
+          <p:nvPr>
+            <p:ph type="pic" sz="quarter" idx="11"/>
+          </p:nvPr>
+        </p:nvSpPr>
+        <p:spPr>
+          <a:xfrm>
+            <a:off x="1939255" y="1645291"/>
+            <a:ext cx="8313488" cy="5144262"/>
+          </a:xfrm>
+        </p:spPr>
+        <p:txBody>
+          <a:bodyPr/>
+          <a:lstStyle/>
+          <a:p>
+            <a:endParaRPr lang="ko-KR" altLang="en-US" dirty="0"/>
+          </a:p>
+        </p:txBody>
+      </p:sp>
+      <p:sp>
+        <p:nvSpPr>
           <p:cNvPr id="4" name="텍스트 개체 틀 3">
             <a:extLst>
               <a:ext uri="{FF2B5EF4-FFF2-40B4-BE49-F238E27FC236}">
-                <a16:creationId xmlns:a16="http://schemas.microsoft.com/office/drawing/2014/main" id="{16F4BE01-22AF-4439-ADBD-3C9C433768AE}"/>
+                <a16:creationId xmlns:a16="http://schemas.microsoft.com/office/drawing/2014/main" id="{2C3D6014-F9F1-4D8B-91B2-A05A60B7FF55}"/>
               </a:ext>
             </a:extLst>
           </p:cNvPr>
@@ -149,21 +182,22 @@
         </p:nvSpPr>
         <p:spPr>
           <a:xfrm>
-            <a:off x="5586536" y="297249"/>
-            <a:ext cx="184731" cy="1089529"/>
+            <a:off x="0" y="15511"/>
+            <a:ext cx="12191999" cy="1698927"/>
           </a:xfrm>
         </p:spPr>
         <p:txBody>
-          <a:bodyPr wrap="none">
+          <a:bodyPr wrap="square">
             <a:spAutoFit/>
           </a:bodyPr>
           <a:lstStyle>
-            <a:lvl1pPr marL="0" indent="0">
+            <a:lvl1pPr marL="0" indent="0" algn="ctr">
               <a:buNone/>
-              <a:defRPr sz="7200" b="1">
+              <a:defRPr sz="11600" b="1">
                 <a:solidFill>
                   <a:srgbClr val="FFFF00"/>
                 </a:solidFill>
+                <a:latin typeface="Arial Black" panose="020B0A04020102020204" pitchFamily="34" charset="0"/>
               </a:defRPr>
             </a:lvl1pPr>
             <a:lvl2pPr>
@@ -198,36 +232,6 @@
           <a:p>
             <a:pPr lvl="0"/>
             <a:endParaRPr lang="ko-KR" altLang="en-US" dirty="0"/>
-          </a:p>
-        </p:txBody>
-      </p:sp>
-      <p:sp>
-        <p:nvSpPr>
-          <p:cNvPr id="6" name="그림 개체 틀 5">
-            <a:extLst>
-              <a:ext uri="{FF2B5EF4-FFF2-40B4-BE49-F238E27FC236}">
-                <a16:creationId xmlns:a16="http://schemas.microsoft.com/office/drawing/2014/main" id="{06EBFD36-46A8-49FB-A5E3-19811D4CF073}"/>
-              </a:ext>
-            </a:extLst>
-          </p:cNvPr>
-          <p:cNvSpPr>
-            <a:spLocks noGrp="1"/>
-          </p:cNvSpPr>
-          <p:nvPr>
-            <p:ph type="pic" sz="quarter" idx="11"/>
-          </p:nvPr>
-        </p:nvSpPr>
-        <p:spPr>
-          <a:xfrm>
-            <a:off x="1955009" y="1538601"/>
-            <a:ext cx="8281982" cy="5047937"/>
-          </a:xfrm>
-        </p:spPr>
-        <p:txBody>
-          <a:bodyPr/>
-          <a:lstStyle/>
-          <a:p>
-            <a:endParaRPr lang="ko-KR" altLang="en-US"/>
           </a:p>
         </p:txBody>
       </p:sp>
@@ -290,10 +294,52 @@
       </p:grpSpPr>
       <p:sp>
         <p:nvSpPr>
-          <p:cNvPr id="4" name="텍스트 개체 틀 3">
+          <p:cNvPr id="3" name="텍스트 개체 틀 2">
             <a:extLst>
               <a:ext uri="{FF2B5EF4-FFF2-40B4-BE49-F238E27FC236}">
-                <a16:creationId xmlns:a16="http://schemas.microsoft.com/office/drawing/2014/main" id="{16F4BE01-22AF-4439-ADBD-3C9C433768AE}"/>
+                <a16:creationId xmlns:a16="http://schemas.microsoft.com/office/drawing/2014/main" id="{35EDAB5D-9D13-4111-A78D-DDC16633D503}"/>
+              </a:ext>
+            </a:extLst>
+          </p:cNvPr>
+          <p:cNvSpPr>
+            <a:spLocks noGrp="1"/>
+          </p:cNvSpPr>
+          <p:nvPr>
+            <p:ph type="body" sz="quarter" idx="11"/>
+          </p:nvPr>
+        </p:nvSpPr>
+        <p:spPr>
+          <a:xfrm>
+            <a:off x="-1" y="3502027"/>
+            <a:ext cx="12192001" cy="1685077"/>
+          </a:xfrm>
+        </p:spPr>
+        <p:txBody>
+          <a:bodyPr wrap="square">
+            <a:spAutoFit/>
+          </a:bodyPr>
+          <a:lstStyle>
+            <a:lvl1pPr marL="0" indent="0" algn="ctr">
+              <a:buNone/>
+              <a:defRPr sz="11500" b="1">
+                <a:solidFill>
+                  <a:srgbClr val="FF0000"/>
+                </a:solidFill>
+              </a:defRPr>
+            </a:lvl1pPr>
+          </a:lstStyle>
+          <a:p>
+            <a:pPr lvl="0"/>
+            <a:endParaRPr lang="ko-KR" altLang="en-US" dirty="0"/>
+          </a:p>
+        </p:txBody>
+      </p:sp>
+      <p:sp>
+        <p:nvSpPr>
+          <p:cNvPr id="5" name="텍스트 개체 틀 3">
+            <a:extLst>
+              <a:ext uri="{FF2B5EF4-FFF2-40B4-BE49-F238E27FC236}">
+                <a16:creationId xmlns:a16="http://schemas.microsoft.com/office/drawing/2014/main" id="{9ABB705E-2551-4D79-9595-C34ED74F469B}"/>
               </a:ext>
             </a:extLst>
           </p:cNvPr>
@@ -306,21 +352,22 @@
         </p:nvSpPr>
         <p:spPr>
           <a:xfrm>
-            <a:off x="6003635" y="297249"/>
-            <a:ext cx="184731" cy="1685077"/>
+            <a:off x="0" y="-145915"/>
+            <a:ext cx="12191999" cy="2017475"/>
           </a:xfrm>
         </p:spPr>
         <p:txBody>
-          <a:bodyPr wrap="none">
+          <a:bodyPr wrap="square">
             <a:spAutoFit/>
           </a:bodyPr>
           <a:lstStyle>
-            <a:lvl1pPr marL="0" indent="0">
+            <a:lvl1pPr marL="0" indent="0" algn="ctr">
               <a:buNone/>
-              <a:defRPr sz="11500" b="1">
+              <a:defRPr sz="13900" b="1">
                 <a:solidFill>
                   <a:srgbClr val="FFFF00"/>
                 </a:solidFill>
+                <a:latin typeface="Arial Black" panose="020B0A04020102020204" pitchFamily="34" charset="0"/>
               </a:defRPr>
             </a:lvl1pPr>
             <a:lvl2pPr>
@@ -351,48 +398,6 @@
                 </a:solidFill>
               </a:defRPr>
             </a:lvl5pPr>
-          </a:lstStyle>
-          <a:p>
-            <a:pPr lvl="0"/>
-            <a:endParaRPr lang="ko-KR" altLang="en-US" dirty="0"/>
-          </a:p>
-        </p:txBody>
-      </p:sp>
-      <p:sp>
-        <p:nvSpPr>
-          <p:cNvPr id="3" name="텍스트 개체 틀 2">
-            <a:extLst>
-              <a:ext uri="{FF2B5EF4-FFF2-40B4-BE49-F238E27FC236}">
-                <a16:creationId xmlns:a16="http://schemas.microsoft.com/office/drawing/2014/main" id="{35EDAB5D-9D13-4111-A78D-DDC16633D503}"/>
-              </a:ext>
-            </a:extLst>
-          </p:cNvPr>
-          <p:cNvSpPr>
-            <a:spLocks noGrp="1"/>
-          </p:cNvSpPr>
-          <p:nvPr>
-            <p:ph type="body" sz="quarter" idx="11"/>
-          </p:nvPr>
-        </p:nvSpPr>
-        <p:spPr>
-          <a:xfrm>
-            <a:off x="6003635" y="3502027"/>
-            <a:ext cx="184731" cy="1200329"/>
-          </a:xfrm>
-        </p:spPr>
-        <p:txBody>
-          <a:bodyPr wrap="none">
-            <a:spAutoFit/>
-          </a:bodyPr>
-          <a:lstStyle>
-            <a:lvl1pPr marL="0" indent="0">
-              <a:buNone/>
-              <a:defRPr sz="8000" b="1">
-                <a:solidFill>
-                  <a:srgbClr val="FF0000"/>
-                </a:solidFill>
-              </a:defRPr>
-            </a:lvl1pPr>
           </a:lstStyle>
           <a:p>
             <a:pPr lvl="0"/>
@@ -475,16 +480,16 @@
         </p:nvSpPr>
         <p:spPr>
           <a:xfrm>
-            <a:off x="6003635" y="2233288"/>
-            <a:ext cx="184731" cy="2391424"/>
+            <a:off x="1" y="1727765"/>
+            <a:ext cx="12191999" cy="2391424"/>
           </a:xfrm>
         </p:spPr>
         <p:txBody>
-          <a:bodyPr wrap="none">
+          <a:bodyPr wrap="square">
             <a:spAutoFit/>
           </a:bodyPr>
           <a:lstStyle>
-            <a:lvl1pPr marL="0" indent="0">
+            <a:lvl1pPr marL="0" indent="0" algn="ctr">
               <a:buNone/>
               <a:defRPr sz="16600" b="1">
                 <a:solidFill>
@@ -689,16 +694,16 @@
         </p:nvSpPr>
         <p:spPr>
           <a:xfrm>
-            <a:off x="6003635" y="2586462"/>
-            <a:ext cx="184731" cy="1685077"/>
+            <a:off x="0" y="2586462"/>
+            <a:ext cx="12192001" cy="1685077"/>
           </a:xfrm>
         </p:spPr>
         <p:txBody>
-          <a:bodyPr wrap="none">
+          <a:bodyPr wrap="square">
             <a:spAutoFit/>
           </a:bodyPr>
           <a:lstStyle>
-            <a:lvl1pPr marL="0" indent="0">
+            <a:lvl1pPr marL="0" indent="0" algn="ctr">
               <a:buNone/>
               <a:defRPr sz="11500" b="1">
                 <a:solidFill>
@@ -750,7 +755,12 @@
 
 <file path=ppt/slideLayouts/slideLayout6.xml><?xml version="1.0" encoding="utf-8"?>
 <p:sldLayout xmlns:a="http://schemas.openxmlformats.org/drawingml/2006/main" xmlns:r="http://schemas.openxmlformats.org/officeDocument/2006/relationships" xmlns:p="http://schemas.openxmlformats.org/presentationml/2006/main" preserve="1" userDrawn="1">
-  <p:cSld name="1_사용자 지정 레이아웃">
+  <p:cSld name="4_사용자 지정 레이아웃">
+    <p:bg>
+      <p:bgRef idx="1001">
+        <a:schemeClr val="bg1"/>
+      </p:bgRef>
+    </p:bg>
     <p:spTree>
       <p:nvGrpSpPr>
         <p:cNvPr id="1" name=""/>
@@ -765,15 +775,156 @@
           <a:chExt cx="0" cy="0"/>
         </a:xfrm>
       </p:grpSpPr>
+      <p:sp>
+        <p:nvSpPr>
+          <p:cNvPr id="5" name="텍스트 개체 틀 4">
+            <a:extLst>
+              <a:ext uri="{FF2B5EF4-FFF2-40B4-BE49-F238E27FC236}">
+                <a16:creationId xmlns:a16="http://schemas.microsoft.com/office/drawing/2014/main" id="{40482AA1-AA13-4AEC-8234-9181D89FAC69}"/>
+              </a:ext>
+            </a:extLst>
+          </p:cNvPr>
+          <p:cNvSpPr>
+            <a:spLocks noGrp="1"/>
+          </p:cNvSpPr>
+          <p:nvPr>
+            <p:ph type="body" sz="quarter" idx="10" hasCustomPrompt="1"/>
+          </p:nvPr>
+        </p:nvSpPr>
+        <p:spPr>
+          <a:xfrm>
+            <a:off x="1091967" y="2371936"/>
+            <a:ext cx="10008066" cy="2114128"/>
+          </a:xfrm>
+        </p:spPr>
+        <p:txBody>
+          <a:bodyPr>
+            <a:noAutofit/>
+          </a:bodyPr>
+          <a:lstStyle>
+            <a:lvl1pPr marL="0" indent="0">
+              <a:buNone/>
+              <a:defRPr sz="11500" b="1"/>
+            </a:lvl1pPr>
+          </a:lstStyle>
+          <a:p>
+            <a:pPr lvl="0"/>
+            <a:r>
+              <a:rPr lang="en-US" altLang="ko-KR" dirty="0"/>
+              <a:t>Say in Korean</a:t>
+            </a:r>
+            <a:endParaRPr lang="ko-KR" altLang="en-US" dirty="0"/>
+          </a:p>
+        </p:txBody>
+      </p:sp>
     </p:spTree>
     <p:extLst>
       <p:ext uri="{BB962C8B-B14F-4D97-AF65-F5344CB8AC3E}">
-        <p14:creationId xmlns:p14="http://schemas.microsoft.com/office/powerpoint/2010/main" val="3414368853"/>
+        <p14:creationId xmlns:p14="http://schemas.microsoft.com/office/powerpoint/2010/main" val="1059060118"/>
       </p:ext>
     </p:extLst>
   </p:cSld>
   <p:clrMapOvr>
-    <a:masterClrMapping/>
+    <a:overrideClrMapping bg1="dk1" tx1="lt1" bg2="dk2" tx2="lt2" accent1="accent1" accent2="accent2" accent3="accent3" accent4="accent4" accent5="accent5" accent6="accent6" hlink="hlink" folHlink="folHlink"/>
+  </p:clrMapOvr>
+  <mc:AlternateContent xmlns:mc="http://schemas.openxmlformats.org/markup-compatibility/2006" xmlns:p14="http://schemas.microsoft.com/office/powerpoint/2010/main">
+    <mc:Choice Requires="p14">
+      <p:transition spd="med" p14:dur="700" advClick="0" advTm="1000">
+        <p:fade/>
+        <p:sndAc>
+          <p:stSnd>
+            <p:snd r:embed="rId1" name="click.wav"/>
+          </p:stSnd>
+        </p:sndAc>
+      </p:transition>
+    </mc:Choice>
+    <mc:Fallback xmlns="">
+      <p:transition spd="med" advClick="0" advTm="1000">
+        <p:fade/>
+        <p:sndAc>
+          <p:stSnd>
+            <p:snd r:embed="rId3" name="click.wav"/>
+          </p:stSnd>
+        </p:sndAc>
+      </p:transition>
+    </mc:Fallback>
+  </mc:AlternateContent>
+</p:sldLayout>
+</file>
+
+<file path=ppt/slideLayouts/slideLayout7.xml><?xml version="1.0" encoding="utf-8"?>
+<p:sldLayout xmlns:a="http://schemas.openxmlformats.org/drawingml/2006/main" xmlns:r="http://schemas.openxmlformats.org/officeDocument/2006/relationships" xmlns:p="http://schemas.openxmlformats.org/presentationml/2006/main" preserve="1" userDrawn="1">
+  <p:cSld name="7_사용자 지정 레이아웃">
+    <p:bg>
+      <p:bgRef idx="1001">
+        <a:schemeClr val="bg1"/>
+      </p:bgRef>
+    </p:bg>
+    <p:spTree>
+      <p:nvGrpSpPr>
+        <p:cNvPr id="1" name=""/>
+        <p:cNvGrpSpPr/>
+        <p:nvPr/>
+      </p:nvGrpSpPr>
+      <p:grpSpPr>
+        <a:xfrm>
+          <a:off x="0" y="0"/>
+          <a:ext cx="0" cy="0"/>
+          <a:chOff x="0" y="0"/>
+          <a:chExt cx="0" cy="0"/>
+        </a:xfrm>
+      </p:grpSpPr>
+      <p:sp>
+        <p:nvSpPr>
+          <p:cNvPr id="5" name="텍스트 개체 틀 4">
+            <a:extLst>
+              <a:ext uri="{FF2B5EF4-FFF2-40B4-BE49-F238E27FC236}">
+                <a16:creationId xmlns:a16="http://schemas.microsoft.com/office/drawing/2014/main" id="{40482AA1-AA13-4AEC-8234-9181D89FAC69}"/>
+              </a:ext>
+            </a:extLst>
+          </p:cNvPr>
+          <p:cNvSpPr>
+            <a:spLocks noGrp="1"/>
+          </p:cNvSpPr>
+          <p:nvPr>
+            <p:ph type="body" sz="quarter" idx="10" hasCustomPrompt="1"/>
+          </p:nvPr>
+        </p:nvSpPr>
+        <p:spPr>
+          <a:xfrm>
+            <a:off x="1091967" y="2371936"/>
+            <a:ext cx="10008066" cy="2114128"/>
+          </a:xfrm>
+        </p:spPr>
+        <p:txBody>
+          <a:bodyPr>
+            <a:noAutofit/>
+          </a:bodyPr>
+          <a:lstStyle>
+            <a:lvl1pPr marL="0" indent="0">
+              <a:buNone/>
+              <a:defRPr sz="11500" b="1"/>
+            </a:lvl1pPr>
+          </a:lstStyle>
+          <a:p>
+            <a:pPr lvl="0"/>
+            <a:r>
+              <a:rPr lang="en-US" altLang="ko-KR" dirty="0"/>
+              <a:t>Say in English</a:t>
+            </a:r>
+            <a:endParaRPr lang="ko-KR" altLang="en-US" dirty="0"/>
+          </a:p>
+        </p:txBody>
+      </p:sp>
+    </p:spTree>
+    <p:extLst>
+      <p:ext uri="{BB962C8B-B14F-4D97-AF65-F5344CB8AC3E}">
+        <p14:creationId xmlns:p14="http://schemas.microsoft.com/office/powerpoint/2010/main" val="283132263"/>
+      </p:ext>
+    </p:extLst>
+  </p:cSld>
+  <p:clrMapOvr>
+    <a:overrideClrMapping bg1="dk1" tx1="lt1" bg2="dk2" tx2="lt2" accent1="accent1" accent2="accent2" accent3="accent3" accent4="accent4" accent5="accent5" accent6="accent6" hlink="hlink" folHlink="folHlink"/>
   </p:clrMapOvr>
   <mc:AlternateContent xmlns:mc="http://schemas.openxmlformats.org/markup-compatibility/2006" xmlns:p14="http://schemas.microsoft.com/office/powerpoint/2010/main">
     <mc:Choice Requires="p14">
@@ -968,7 +1119,7 @@
           <a:p>
             <a:fld id="{D880F4F0-8576-44C0-8B5A-9ED4C3446C61}" type="datetimeFigureOut">
               <a:rPr lang="ko-KR" altLang="en-US" smtClean="0"/>
-              <a:t>2018. 9. 20.</a:t>
+              <a:t>2018-09-20</a:t>
             </a:fld>
             <a:endParaRPr lang="ko-KR" altLang="en-US"/>
           </a:p>
@@ -1078,7 +1229,8 @@
     <p:sldLayoutId id="2147483652" r:id="rId3"/>
     <p:sldLayoutId id="2147483653" r:id="rId4"/>
     <p:sldLayoutId id="2147483656" r:id="rId5"/>
-    <p:sldLayoutId id="2147483651" r:id="rId6"/>
+    <p:sldLayoutId id="2147483657" r:id="rId6"/>
+    <p:sldLayoutId id="2147483658" r:id="rId7"/>
   </p:sldLayoutIdLst>
   <mc:AlternateContent xmlns:mc="http://schemas.openxmlformats.org/markup-compatibility/2006" xmlns:p14="http://schemas.microsoft.com/office/powerpoint/2010/main">
     <mc:Choice Requires="p14">
@@ -1086,7 +1238,7 @@
         <p:fade/>
         <p:sndAc>
           <p:stSnd>
-            <p:snd r:embed="rId8" name="click.wav"/>
+            <p:snd r:embed="rId9" name="click.wav"/>
           </p:stSnd>
         </p:sndAc>
       </p:transition>
@@ -1096,7 +1248,7 @@
         <p:fade/>
         <p:sndAc>
           <p:stSnd>
-            <p:snd r:embed="rId9" name="click.wav"/>
+            <p:snd r:embed="rId10" name="click.wav"/>
           </p:stSnd>
         </p:sndAc>
       </p:transition>
@@ -1383,6 +1535,99 @@
     </p:otherStyle>
   </p:txStyles>
 </p:sldMaster>
+</file>
+
+<file path=ppt/slides/slide1.xml><?xml version="1.0" encoding="utf-8"?>
+<p:sld xmlns:a="http://schemas.openxmlformats.org/drawingml/2006/main" xmlns:r="http://schemas.openxmlformats.org/officeDocument/2006/relationships" xmlns:p="http://schemas.openxmlformats.org/presentationml/2006/main">
+  <p:cSld>
+    <p:spTree>
+      <p:nvGrpSpPr>
+        <p:cNvPr id="1" name=""/>
+        <p:cNvGrpSpPr/>
+        <p:nvPr/>
+      </p:nvGrpSpPr>
+      <p:grpSpPr>
+        <a:xfrm>
+          <a:off x="0" y="0"/>
+          <a:ext cx="0" cy="0"/>
+          <a:chOff x="0" y="0"/>
+          <a:chExt cx="0" cy="0"/>
+        </a:xfrm>
+      </p:grpSpPr>
+      <p:sp>
+        <p:nvSpPr>
+          <p:cNvPr id="4" name="TextBox 3">
+            <a:extLst>
+              <a:ext uri="{FF2B5EF4-FFF2-40B4-BE49-F238E27FC236}">
+                <a16:creationId xmlns:a16="http://schemas.microsoft.com/office/drawing/2014/main" id="{3B14DD17-E3E2-43C2-92EB-2371D75ECDC4}"/>
+              </a:ext>
+            </a:extLst>
+          </p:cNvPr>
+          <p:cNvSpPr txBox="1"/>
+          <p:nvPr/>
+        </p:nvSpPr>
+        <p:spPr>
+          <a:xfrm>
+            <a:off x="2537883" y="1905506"/>
+            <a:ext cx="7116234" cy="3046988"/>
+          </a:xfrm>
+          <a:prstGeom prst="rect">
+            <a:avLst/>
+          </a:prstGeom>
+          <a:noFill/>
+        </p:spPr>
+        <p:txBody>
+          <a:bodyPr wrap="square" rtlCol="0">
+            <a:spAutoFit/>
+          </a:bodyPr>
+          <a:lstStyle/>
+          <a:p>
+            <a:r>
+              <a:rPr lang="en-US" altLang="ko-KR" sz="9600" b="1" dirty="0"/>
+              <a:t>Lesson</a:t>
+            </a:r>
+          </a:p>
+          <a:p>
+            <a:r>
+              <a:rPr lang="ko-KR" altLang="en-US" sz="9600" b="1" dirty="0"/>
+              <a:t>단어 깜빡이</a:t>
+            </a:r>
+          </a:p>
+        </p:txBody>
+      </p:sp>
+    </p:spTree>
+    <p:extLst>
+      <p:ext uri="{BB962C8B-B14F-4D97-AF65-F5344CB8AC3E}">
+        <p14:creationId xmlns:p14="http://schemas.microsoft.com/office/powerpoint/2010/main" val="3491080741"/>
+      </p:ext>
+    </p:extLst>
+  </p:cSld>
+  <p:clrMapOvr>
+    <a:masterClrMapping/>
+  </p:clrMapOvr>
+  <mc:AlternateContent xmlns:mc="http://schemas.openxmlformats.org/markup-compatibility/2006" xmlns:p14="http://schemas.microsoft.com/office/powerpoint/2010/main">
+    <mc:Choice Requires="p14">
+      <p:transition spd="med" p14:dur="700" advClick="0" advTm="1000">
+        <p:fade/>
+        <p:sndAc>
+          <p:stSnd>
+            <p:snd r:embed="rId2" name="whoosh.wav"/>
+          </p:stSnd>
+        </p:sndAc>
+      </p:transition>
+    </mc:Choice>
+    <mc:Fallback xmlns="">
+      <p:transition spd="med" advClick="0" advTm="1000">
+        <p:fade/>
+        <p:sndAc>
+          <p:stSnd>
+            <p:snd r:embed="rId3" name="whoosh.wav"/>
+          </p:stSnd>
+        </p:sndAc>
+      </p:transition>
+    </mc:Fallback>
+  </mc:AlternateContent>
+</p:sld>
 </file>
 
 <file path=ppt/theme/theme1.xml><?xml version="1.0" encoding="utf-8"?>

</xml_diff>

<commit_message>
word flicker maker multiple messages on quit solved word flicker maker - search for words on dictionary downloaded keyword data is now stored to json file
</commit_message>
<xml_diff>
--- a/template_for_word_flicker.pptx
+++ b/template_for_word_flicker.pptx
@@ -177,7 +177,7 @@
             <a:spLocks noGrp="1"/>
           </p:cNvSpPr>
           <p:nvPr>
-            <p:ph type="body" sz="quarter" idx="10"/>
+            <p:ph type="body" sz="quarter" idx="10" hasCustomPrompt="1"/>
           </p:nvPr>
         </p:nvSpPr>
         <p:spPr>
@@ -231,6 +231,10 @@
           </a:lstStyle>
           <a:p>
             <a:pPr lvl="0"/>
+            <a:r>
+              <a:rPr lang="en-US" altLang="ko-KR" dirty="0"/>
+              <a:t>w</a:t>
+            </a:r>
             <a:endParaRPr lang="ko-KR" altLang="en-US" dirty="0"/>
           </a:p>
         </p:txBody>
@@ -305,7 +309,7 @@
             <a:spLocks noGrp="1"/>
           </p:cNvSpPr>
           <p:nvPr>
-            <p:ph type="body" sz="quarter" idx="11"/>
+            <p:ph type="body" sz="quarter" idx="11" hasCustomPrompt="1"/>
           </p:nvPr>
         </p:nvSpPr>
         <p:spPr>
@@ -330,6 +334,10 @@
           </a:lstStyle>
           <a:p>
             <a:pPr lvl="0"/>
+            <a:r>
+              <a:rPr lang="en-US" altLang="ko-KR" dirty="0"/>
+              <a:t>m</a:t>
+            </a:r>
             <a:endParaRPr lang="ko-KR" altLang="en-US" dirty="0"/>
           </a:p>
         </p:txBody>
@@ -347,12 +355,12 @@
             <a:spLocks noGrp="1"/>
           </p:cNvSpPr>
           <p:nvPr>
-            <p:ph type="body" sz="quarter" idx="10"/>
+            <p:ph type="body" sz="quarter" idx="10" hasCustomPrompt="1"/>
           </p:nvPr>
         </p:nvSpPr>
         <p:spPr>
           <a:xfrm>
-            <a:off x="0" y="-145915"/>
+            <a:off x="0" y="100481"/>
             <a:ext cx="12191999" cy="2017475"/>
           </a:xfrm>
         </p:spPr>
@@ -401,6 +409,10 @@
           </a:lstStyle>
           <a:p>
             <a:pPr lvl="0"/>
+            <a:r>
+              <a:rPr lang="en-US" altLang="ko-KR" dirty="0"/>
+              <a:t>w</a:t>
+            </a:r>
             <a:endParaRPr lang="ko-KR" altLang="en-US" dirty="0"/>
           </a:p>
         </p:txBody>
@@ -480,8 +492,8 @@
         </p:nvSpPr>
         <p:spPr>
           <a:xfrm>
-            <a:off x="1" y="1727765"/>
-            <a:ext cx="12191999" cy="2391424"/>
+            <a:off x="1" y="2136339"/>
+            <a:ext cx="12191999" cy="2585323"/>
           </a:xfrm>
         </p:spPr>
         <p:txBody>
@@ -491,7 +503,7 @@
           <a:lstStyle>
             <a:lvl1pPr marL="0" indent="0" algn="ctr">
               <a:buNone/>
-              <a:defRPr sz="16600" b="1">
+              <a:defRPr sz="18000" b="1">
                 <a:solidFill>
                   <a:srgbClr val="FFFF00"/>
                 </a:solidFill>
@@ -689,7 +701,7 @@
             <a:spLocks noGrp="1"/>
           </p:cNvSpPr>
           <p:nvPr>
-            <p:ph type="body" sz="quarter" idx="11"/>
+            <p:ph type="body" sz="quarter" idx="11" hasCustomPrompt="1"/>
           </p:nvPr>
         </p:nvSpPr>
         <p:spPr>
@@ -714,6 +726,10 @@
           </a:lstStyle>
           <a:p>
             <a:pPr lvl="0"/>
+            <a:r>
+              <a:rPr lang="en-US" altLang="ko-KR" dirty="0"/>
+              <a:t>m</a:t>
+            </a:r>
             <a:endParaRPr lang="ko-KR" altLang="en-US" dirty="0"/>
           </a:p>
         </p:txBody>
@@ -777,43 +793,54 @@
       </p:grpSpPr>
       <p:sp>
         <p:nvSpPr>
-          <p:cNvPr id="5" name="텍스트 개체 틀 4">
+          <p:cNvPr id="2" name="TextBox 1">
             <a:extLst>
               <a:ext uri="{FF2B5EF4-FFF2-40B4-BE49-F238E27FC236}">
-                <a16:creationId xmlns:a16="http://schemas.microsoft.com/office/drawing/2014/main" id="{40482AA1-AA13-4AEC-8234-9181D89FAC69}"/>
+                <a16:creationId xmlns:a16="http://schemas.microsoft.com/office/drawing/2014/main" id="{33D99006-D0F1-4ED6-916D-C48F85C86D58}"/>
               </a:ext>
             </a:extLst>
           </p:cNvPr>
-          <p:cNvSpPr>
-            <a:spLocks noGrp="1"/>
-          </p:cNvSpPr>
-          <p:nvPr>
-            <p:ph type="body" sz="quarter" idx="10" hasCustomPrompt="1"/>
-          </p:nvPr>
+          <p:cNvSpPr txBox="1"/>
+          <p:nvPr userDrawn="1"/>
         </p:nvSpPr>
         <p:spPr>
           <a:xfrm>
-            <a:off x="1091967" y="2371936"/>
-            <a:ext cx="10008066" cy="2114128"/>
+            <a:off x="1140718" y="2497976"/>
+            <a:ext cx="9910564" cy="1862048"/>
           </a:xfrm>
+          <a:prstGeom prst="rect">
+            <a:avLst/>
+          </a:prstGeom>
+          <a:noFill/>
         </p:spPr>
         <p:txBody>
-          <a:bodyPr>
-            <a:noAutofit/>
+          <a:bodyPr wrap="square" rtlCol="0">
+            <a:spAutoFit/>
           </a:bodyPr>
-          <a:lstStyle>
-            <a:lvl1pPr marL="0" indent="0">
+          <a:lstStyle/>
+          <a:p>
+            <a:pPr marL="0" marR="0" lvl="0" indent="0" algn="l" defTabSz="914400" rtl="0" eaLnBrk="1" fontAlgn="auto" latinLnBrk="1" hangingPunct="1">
+              <a:lnSpc>
+                <a:spcPct val="100000"/>
+              </a:lnSpc>
+              <a:spcBef>
+                <a:spcPts val="0"/>
+              </a:spcBef>
+              <a:spcAft>
+                <a:spcPts val="0"/>
+              </a:spcAft>
+              <a:buClrTx/>
+              <a:buSzTx/>
+              <a:buFontTx/>
               <a:buNone/>
-              <a:defRPr sz="11500" b="1"/>
-            </a:lvl1pPr>
-          </a:lstStyle>
-          <a:p>
-            <a:pPr lvl="0"/>
+              <a:tabLst/>
+              <a:defRPr/>
+            </a:pPr>
             <a:r>
-              <a:rPr lang="en-US" altLang="ko-KR" dirty="0"/>
+              <a:rPr lang="en-US" altLang="ko-KR" sz="11500" b="1" dirty="0"/>
               <a:t>Say in Korean</a:t>
             </a:r>
-            <a:endParaRPr lang="ko-KR" altLang="en-US" dirty="0"/>
+            <a:endParaRPr lang="ko-KR" altLang="en-US" sz="11500" b="1" dirty="0"/>
           </a:p>
         </p:txBody>
       </p:sp>
@@ -876,43 +903,54 @@
       </p:grpSpPr>
       <p:sp>
         <p:nvSpPr>
-          <p:cNvPr id="5" name="텍스트 개체 틀 4">
+          <p:cNvPr id="2" name="TextBox 1">
             <a:extLst>
               <a:ext uri="{FF2B5EF4-FFF2-40B4-BE49-F238E27FC236}">
-                <a16:creationId xmlns:a16="http://schemas.microsoft.com/office/drawing/2014/main" id="{40482AA1-AA13-4AEC-8234-9181D89FAC69}"/>
+                <a16:creationId xmlns:a16="http://schemas.microsoft.com/office/drawing/2014/main" id="{CC8E1046-89B7-474C-9B5B-DBAA5905CAAE}"/>
               </a:ext>
             </a:extLst>
           </p:cNvPr>
-          <p:cNvSpPr>
-            <a:spLocks noGrp="1"/>
-          </p:cNvSpPr>
-          <p:nvPr>
-            <p:ph type="body" sz="quarter" idx="10" hasCustomPrompt="1"/>
-          </p:nvPr>
+          <p:cNvSpPr txBox="1"/>
+          <p:nvPr userDrawn="1"/>
         </p:nvSpPr>
         <p:spPr>
           <a:xfrm>
-            <a:off x="1091967" y="2371936"/>
-            <a:ext cx="10008066" cy="2114128"/>
+            <a:off x="933564" y="2497976"/>
+            <a:ext cx="10324872" cy="1862048"/>
           </a:xfrm>
+          <a:prstGeom prst="rect">
+            <a:avLst/>
+          </a:prstGeom>
+          <a:noFill/>
         </p:spPr>
         <p:txBody>
-          <a:bodyPr>
-            <a:noAutofit/>
+          <a:bodyPr wrap="square" rtlCol="0">
+            <a:spAutoFit/>
           </a:bodyPr>
-          <a:lstStyle>
-            <a:lvl1pPr marL="0" indent="0">
+          <a:lstStyle/>
+          <a:p>
+            <a:pPr marL="0" marR="0" lvl="0" indent="0" algn="l" defTabSz="914400" rtl="0" eaLnBrk="1" fontAlgn="auto" latinLnBrk="1" hangingPunct="1">
+              <a:lnSpc>
+                <a:spcPct val="100000"/>
+              </a:lnSpc>
+              <a:spcBef>
+                <a:spcPts val="0"/>
+              </a:spcBef>
+              <a:spcAft>
+                <a:spcPts val="0"/>
+              </a:spcAft>
+              <a:buClrTx/>
+              <a:buSzTx/>
+              <a:buFontTx/>
               <a:buNone/>
-              <a:defRPr sz="11500" b="1"/>
-            </a:lvl1pPr>
-          </a:lstStyle>
-          <a:p>
-            <a:pPr lvl="0"/>
+              <a:tabLst/>
+              <a:defRPr/>
+            </a:pPr>
             <a:r>
-              <a:rPr lang="en-US" altLang="ko-KR" dirty="0"/>
+              <a:rPr lang="en-US" altLang="ko-KR" sz="11500" b="1" dirty="0"/>
               <a:t>Say in English</a:t>
             </a:r>
-            <a:endParaRPr lang="ko-KR" altLang="en-US" dirty="0"/>
+            <a:endParaRPr lang="ko-KR" altLang="en-US" sz="11500" b="1" dirty="0"/>
           </a:p>
         </p:txBody>
       </p:sp>
@@ -1119,7 +1157,7 @@
           <a:p>
             <a:fld id="{D880F4F0-8576-44C0-8B5A-9ED4C3446C61}" type="datetimeFigureOut">
               <a:rPr lang="ko-KR" altLang="en-US" smtClean="0"/>
-              <a:t>2018-09-20</a:t>
+              <a:t>2018. 9. 22.</a:t>
             </a:fld>
             <a:endParaRPr lang="ko-KR" altLang="en-US"/>
           </a:p>
@@ -1582,12 +1620,14 @@
           </a:bodyPr>
           <a:lstStyle/>
           <a:p>
+            <a:pPr algn="ctr"/>
             <a:r>
               <a:rPr lang="en-US" altLang="ko-KR" sz="9600" b="1" dirty="0"/>
               <a:t>Lesson</a:t>
             </a:r>
           </a:p>
           <a:p>
+            <a:pPr algn="ctr"/>
             <a:r>
               <a:rPr lang="ko-KR" altLang="en-US" sz="9600" b="1" dirty="0"/>
               <a:t>단어 깜빡이</a:t>

</xml_diff>

<commit_message>
in enter words _ is changes into a blank space
</commit_message>
<xml_diff>
--- a/template_for_word_flicker.pptx
+++ b/template_for_word_flicker.pptx
@@ -777,43 +777,48 @@
       </p:grpSpPr>
       <p:sp>
         <p:nvSpPr>
-          <p:cNvPr id="5" name="텍스트 개체 틀 4">
-            <a:extLst>
-              <a:ext uri="{FF2B5EF4-FFF2-40B4-BE49-F238E27FC236}">
-                <a16:creationId xmlns:a16="http://schemas.microsoft.com/office/drawing/2014/main" id="{40482AA1-AA13-4AEC-8234-9181D89FAC69}"/>
-              </a:ext>
-            </a:extLst>
-          </p:cNvPr>
-          <p:cNvSpPr>
-            <a:spLocks noGrp="1"/>
-          </p:cNvSpPr>
-          <p:nvPr>
-            <p:ph type="body" sz="quarter" idx="10" hasCustomPrompt="1"/>
-          </p:nvPr>
+          <p:cNvPr id="2" name="TextBox 1"/>
+          <p:cNvSpPr txBox="1"/>
+          <p:nvPr userDrawn="1"/>
         </p:nvSpPr>
         <p:spPr>
           <a:xfrm>
-            <a:off x="1091967" y="2371936"/>
-            <a:ext cx="10008066" cy="2114128"/>
+            <a:off x="982134" y="2497976"/>
+            <a:ext cx="10227733" cy="1862048"/>
           </a:xfrm>
+          <a:prstGeom prst="rect">
+            <a:avLst/>
+          </a:prstGeom>
+          <a:noFill/>
         </p:spPr>
         <p:txBody>
-          <a:bodyPr>
-            <a:noAutofit/>
+          <a:bodyPr wrap="square" rtlCol="0">
+            <a:spAutoFit/>
           </a:bodyPr>
-          <a:lstStyle>
-            <a:lvl1pPr marL="0" indent="0">
+          <a:lstStyle/>
+          <a:p>
+            <a:pPr marL="0" marR="0" lvl="0" indent="0" algn="l" defTabSz="914400" rtl="0" eaLnBrk="1" fontAlgn="auto" latinLnBrk="1" hangingPunct="1">
+              <a:lnSpc>
+                <a:spcPct val="100000"/>
+              </a:lnSpc>
+              <a:spcBef>
+                <a:spcPts val="0"/>
+              </a:spcBef>
+              <a:spcAft>
+                <a:spcPts val="0"/>
+              </a:spcAft>
+              <a:buClrTx/>
+              <a:buSzTx/>
+              <a:buFontTx/>
               <a:buNone/>
-              <a:defRPr sz="11500" b="1"/>
-            </a:lvl1pPr>
-          </a:lstStyle>
-          <a:p>
-            <a:pPr lvl="0"/>
+              <a:tabLst/>
+              <a:defRPr/>
+            </a:pPr>
             <a:r>
-              <a:rPr lang="en-US" altLang="ko-KR" dirty="0"/>
+              <a:rPr lang="en-US" altLang="ko-KR" sz="11500" b="1" dirty="0" smtClean="0"/>
               <a:t>Say in Korean</a:t>
             </a:r>
-            <a:endParaRPr lang="ko-KR" altLang="en-US" dirty="0"/>
+            <a:endParaRPr lang="ko-KR" altLang="en-US" sz="11500" b="1" dirty="0" smtClean="0"/>
           </a:p>
         </p:txBody>
       </p:sp>
@@ -876,43 +881,47 @@
       </p:grpSpPr>
       <p:sp>
         <p:nvSpPr>
-          <p:cNvPr id="5" name="텍스트 개체 틀 4">
-            <a:extLst>
-              <a:ext uri="{FF2B5EF4-FFF2-40B4-BE49-F238E27FC236}">
-                <a16:creationId xmlns:a16="http://schemas.microsoft.com/office/drawing/2014/main" id="{40482AA1-AA13-4AEC-8234-9181D89FAC69}"/>
-              </a:ext>
-            </a:extLst>
-          </p:cNvPr>
-          <p:cNvSpPr>
-            <a:spLocks noGrp="1"/>
-          </p:cNvSpPr>
-          <p:nvPr>
-            <p:ph type="body" sz="quarter" idx="10" hasCustomPrompt="1"/>
-          </p:nvPr>
+          <p:cNvPr id="4" name="TextBox 3"/>
+          <p:cNvSpPr txBox="1"/>
+          <p:nvPr userDrawn="1"/>
         </p:nvSpPr>
         <p:spPr>
           <a:xfrm>
-            <a:off x="1091967" y="2371936"/>
-            <a:ext cx="10008066" cy="2114128"/>
+            <a:off x="982134" y="2497976"/>
+            <a:ext cx="10227733" cy="1862048"/>
           </a:xfrm>
+          <a:prstGeom prst="rect">
+            <a:avLst/>
+          </a:prstGeom>
+          <a:noFill/>
         </p:spPr>
         <p:txBody>
-          <a:bodyPr>
-            <a:noAutofit/>
+          <a:bodyPr wrap="square" rtlCol="0">
+            <a:spAutoFit/>
           </a:bodyPr>
-          <a:lstStyle>
-            <a:lvl1pPr marL="0" indent="0">
+          <a:lstStyle/>
+          <a:p>
+            <a:pPr marL="0" marR="0" lvl="0" indent="0" algn="l" defTabSz="914400" rtl="0" eaLnBrk="1" fontAlgn="auto" latinLnBrk="1" hangingPunct="1">
+              <a:lnSpc>
+                <a:spcPct val="100000"/>
+              </a:lnSpc>
+              <a:spcBef>
+                <a:spcPts val="0"/>
+              </a:spcBef>
+              <a:spcAft>
+                <a:spcPts val="0"/>
+              </a:spcAft>
+              <a:buClrTx/>
+              <a:buSzTx/>
+              <a:buFontTx/>
               <a:buNone/>
-              <a:defRPr sz="11500" b="1"/>
-            </a:lvl1pPr>
-          </a:lstStyle>
-          <a:p>
-            <a:pPr lvl="0"/>
+              <a:tabLst/>
+              <a:defRPr/>
+            </a:pPr>
             <a:r>
-              <a:rPr lang="en-US" altLang="ko-KR" dirty="0"/>
+              <a:rPr lang="en-US" altLang="ko-KR" sz="11500" b="1" dirty="0" smtClean="0"/>
               <a:t>Say in English</a:t>
             </a:r>
-            <a:endParaRPr lang="ko-KR" altLang="en-US" dirty="0"/>
           </a:p>
         </p:txBody>
       </p:sp>
@@ -1119,7 +1128,7 @@
           <a:p>
             <a:fld id="{D880F4F0-8576-44C0-8B5A-9ED4C3446C61}" type="datetimeFigureOut">
               <a:rPr lang="ko-KR" altLang="en-US" smtClean="0"/>
-              <a:t>2018-09-21</a:t>
+              <a:t>2018-10-17</a:t>
             </a:fld>
             <a:endParaRPr lang="ko-KR" altLang="en-US"/>
           </a:p>

</xml_diff>

<commit_message>
syllable divider added to word_flicker
</commit_message>
<xml_diff>
--- a/template_for_word_flicker.pptx
+++ b/template_for_word_flicker.pptx
@@ -4,6 +4,9 @@
   <p:sldMasterIdLst>
     <p:sldMasterId id="2147483648" r:id="rId1"/>
   </p:sldMasterIdLst>
+  <p:handoutMasterIdLst>
+    <p:handoutMasterId r:id="rId3"/>
+  </p:handoutMasterIdLst>
   <p:sldIdLst>
     <p:sldId id="289" r:id="rId2"/>
   </p:sldIdLst>
@@ -108,8 +111,200 @@
     <p:ext uri="{EFAFB233-063F-42B5-8137-9DF3F51BA10A}">
       <p15:sldGuideLst xmlns:p15="http://schemas.microsoft.com/office/powerpoint/2012/main"/>
     </p:ext>
+    <p:ext uri="{2D200454-40CA-4A62-9FC3-DE9A4176ACB9}">
+      <p15:notesGuideLst xmlns:p15="http://schemas.microsoft.com/office/powerpoint/2012/main"/>
+    </p:ext>
   </p:extLst>
 </p:presentation>
+</file>
+
+<file path=ppt/handoutMasters/handoutMaster1.xml><?xml version="1.0" encoding="utf-8"?>
+<p:handoutMaster xmlns:a="http://schemas.openxmlformats.org/drawingml/2006/main" xmlns:r="http://schemas.openxmlformats.org/officeDocument/2006/relationships" xmlns:p="http://schemas.openxmlformats.org/presentationml/2006/main">
+  <p:cSld>
+    <p:bg>
+      <p:bgRef idx="1001">
+        <a:schemeClr val="bg1"/>
+      </p:bgRef>
+    </p:bg>
+    <p:spTree>
+      <p:nvGrpSpPr>
+        <p:cNvPr id="1" name=""/>
+        <p:cNvGrpSpPr/>
+        <p:nvPr/>
+      </p:nvGrpSpPr>
+      <p:grpSpPr>
+        <a:xfrm>
+          <a:off x="0" y="0"/>
+          <a:ext cx="0" cy="0"/>
+          <a:chOff x="0" y="0"/>
+          <a:chExt cx="0" cy="0"/>
+        </a:xfrm>
+      </p:grpSpPr>
+      <p:sp>
+        <p:nvSpPr>
+          <p:cNvPr id="2" name="머리글 개체 틀 1">
+            <a:extLst>
+              <a:ext uri="{FF2B5EF4-FFF2-40B4-BE49-F238E27FC236}">
+                <a16:creationId xmlns:a16="http://schemas.microsoft.com/office/drawing/2014/main" id="{2BD6E333-E06E-4621-BE83-E2388D99D108}"/>
+              </a:ext>
+            </a:extLst>
+          </p:cNvPr>
+          <p:cNvSpPr>
+            <a:spLocks noGrp="1"/>
+          </p:cNvSpPr>
+          <p:nvPr>
+            <p:ph type="hdr" sz="quarter"/>
+          </p:nvPr>
+        </p:nvSpPr>
+        <p:spPr>
+          <a:xfrm>
+            <a:off x="0" y="0"/>
+            <a:ext cx="2971800" cy="458788"/>
+          </a:xfrm>
+          <a:prstGeom prst="rect">
+            <a:avLst/>
+          </a:prstGeom>
+        </p:spPr>
+        <p:txBody>
+          <a:bodyPr vert="horz" lIns="91440" tIns="45720" rIns="91440" bIns="45720" rtlCol="0"/>
+          <a:lstStyle>
+            <a:lvl1pPr algn="l">
+              <a:defRPr sz="1200"/>
+            </a:lvl1pPr>
+          </a:lstStyle>
+          <a:p>
+            <a:endParaRPr lang="ko-KR" altLang="en-US"/>
+          </a:p>
+        </p:txBody>
+      </p:sp>
+      <p:sp>
+        <p:nvSpPr>
+          <p:cNvPr id="3" name="날짜 개체 틀 2">
+            <a:extLst>
+              <a:ext uri="{FF2B5EF4-FFF2-40B4-BE49-F238E27FC236}">
+                <a16:creationId xmlns:a16="http://schemas.microsoft.com/office/drawing/2014/main" id="{B255D64C-FA25-4D46-8B7F-BEC6EA3B3EED}"/>
+              </a:ext>
+            </a:extLst>
+          </p:cNvPr>
+          <p:cNvSpPr>
+            <a:spLocks noGrp="1"/>
+          </p:cNvSpPr>
+          <p:nvPr>
+            <p:ph type="dt" sz="quarter" idx="1"/>
+          </p:nvPr>
+        </p:nvSpPr>
+        <p:spPr>
+          <a:xfrm>
+            <a:off x="3884613" y="0"/>
+            <a:ext cx="2971800" cy="458788"/>
+          </a:xfrm>
+          <a:prstGeom prst="rect">
+            <a:avLst/>
+          </a:prstGeom>
+        </p:spPr>
+        <p:txBody>
+          <a:bodyPr vert="horz" lIns="91440" tIns="45720" rIns="91440" bIns="45720" rtlCol="0"/>
+          <a:lstStyle>
+            <a:lvl1pPr algn="r">
+              <a:defRPr sz="1200"/>
+            </a:lvl1pPr>
+          </a:lstStyle>
+          <a:p>
+            <a:fld id="{A40184D9-6173-44A3-AE7E-1195643E92F2}" type="datetimeFigureOut">
+              <a:rPr lang="ko-KR" altLang="en-US" smtClean="0"/>
+              <a:t>2018. 10. 21.</a:t>
+            </a:fld>
+            <a:endParaRPr lang="ko-KR" altLang="en-US"/>
+          </a:p>
+        </p:txBody>
+      </p:sp>
+      <p:sp>
+        <p:nvSpPr>
+          <p:cNvPr id="4" name="바닥글 개체 틀 3">
+            <a:extLst>
+              <a:ext uri="{FF2B5EF4-FFF2-40B4-BE49-F238E27FC236}">
+                <a16:creationId xmlns:a16="http://schemas.microsoft.com/office/drawing/2014/main" id="{7DA3C945-F2F0-43DD-9B4B-E286866D662C}"/>
+              </a:ext>
+            </a:extLst>
+          </p:cNvPr>
+          <p:cNvSpPr>
+            <a:spLocks noGrp="1"/>
+          </p:cNvSpPr>
+          <p:nvPr>
+            <p:ph type="ftr" sz="quarter" idx="2"/>
+          </p:nvPr>
+        </p:nvSpPr>
+        <p:spPr>
+          <a:xfrm>
+            <a:off x="0" y="8685213"/>
+            <a:ext cx="2971800" cy="458787"/>
+          </a:xfrm>
+          <a:prstGeom prst="rect">
+            <a:avLst/>
+          </a:prstGeom>
+        </p:spPr>
+        <p:txBody>
+          <a:bodyPr vert="horz" lIns="91440" tIns="45720" rIns="91440" bIns="45720" rtlCol="0" anchor="b"/>
+          <a:lstStyle>
+            <a:lvl1pPr algn="l">
+              <a:defRPr sz="1200"/>
+            </a:lvl1pPr>
+          </a:lstStyle>
+          <a:p>
+            <a:endParaRPr lang="ko-KR" altLang="en-US"/>
+          </a:p>
+        </p:txBody>
+      </p:sp>
+      <p:sp>
+        <p:nvSpPr>
+          <p:cNvPr id="5" name="슬라이드 번호 개체 틀 4">
+            <a:extLst>
+              <a:ext uri="{FF2B5EF4-FFF2-40B4-BE49-F238E27FC236}">
+                <a16:creationId xmlns:a16="http://schemas.microsoft.com/office/drawing/2014/main" id="{BC8C4607-ABA5-4E2B-91E6-4C5EEB2DD93F}"/>
+              </a:ext>
+            </a:extLst>
+          </p:cNvPr>
+          <p:cNvSpPr>
+            <a:spLocks noGrp="1"/>
+          </p:cNvSpPr>
+          <p:nvPr>
+            <p:ph type="sldNum" sz="quarter" idx="3"/>
+          </p:nvPr>
+        </p:nvSpPr>
+        <p:spPr>
+          <a:xfrm>
+            <a:off x="3884613" y="8685213"/>
+            <a:ext cx="2971800" cy="458787"/>
+          </a:xfrm>
+          <a:prstGeom prst="rect">
+            <a:avLst/>
+          </a:prstGeom>
+        </p:spPr>
+        <p:txBody>
+          <a:bodyPr vert="horz" lIns="91440" tIns="45720" rIns="91440" bIns="45720" rtlCol="0" anchor="b"/>
+          <a:lstStyle>
+            <a:lvl1pPr algn="r">
+              <a:defRPr sz="1200"/>
+            </a:lvl1pPr>
+          </a:lstStyle>
+          <a:p>
+            <a:fld id="{186A6838-0991-42C7-A60C-6A1584F936DE}" type="slidenum">
+              <a:rPr lang="ko-KR" altLang="en-US" smtClean="0"/>
+              <a:t>‹#›</a:t>
+            </a:fld>
+            <a:endParaRPr lang="ko-KR" altLang="en-US"/>
+          </a:p>
+        </p:txBody>
+      </p:sp>
+    </p:spTree>
+    <p:extLst>
+      <p:ext uri="{BB962C8B-B14F-4D97-AF65-F5344CB8AC3E}">
+        <p14:creationId xmlns:p14="http://schemas.microsoft.com/office/powerpoint/2010/main" val="901023562"/>
+      </p:ext>
+    </p:extLst>
+  </p:cSld>
+  <p:clrMap bg1="lt1" tx1="dk1" bg2="lt2" tx2="dk2" accent1="accent1" accent2="accent2" accent3="accent3" accent4="accent4" accent5="accent5" accent6="accent6" hlink="hlink" folHlink="folHlink"/>
+</p:handoutMaster>
 </file>
 
 <file path=ppt/slideLayouts/slideLayout1.xml><?xml version="1.0" encoding="utf-8"?>
@@ -755,6 +950,616 @@
 
 <file path=ppt/slideLayouts/slideLayout6.xml><?xml version="1.0" encoding="utf-8"?>
 <p:sldLayout xmlns:a="http://schemas.openxmlformats.org/drawingml/2006/main" xmlns:r="http://schemas.openxmlformats.org/officeDocument/2006/relationships" xmlns:p="http://schemas.openxmlformats.org/presentationml/2006/main" preserve="1" userDrawn="1">
+  <p:cSld name="8_사용자 지정 레이아웃">
+    <p:bg>
+      <p:bgRef idx="1001">
+        <a:schemeClr val="bg1"/>
+      </p:bgRef>
+    </p:bg>
+    <p:spTree>
+      <p:nvGrpSpPr>
+        <p:cNvPr id="1" name=""/>
+        <p:cNvGrpSpPr/>
+        <p:nvPr/>
+      </p:nvGrpSpPr>
+      <p:grpSpPr>
+        <a:xfrm>
+          <a:off x="0" y="0"/>
+          <a:ext cx="0" cy="0"/>
+          <a:chOff x="0" y="0"/>
+          <a:chExt cx="0" cy="0"/>
+        </a:xfrm>
+      </p:grpSpPr>
+      <p:sp>
+        <p:nvSpPr>
+          <p:cNvPr id="2" name="텍스트 개체 틀 3">
+            <a:extLst>
+              <a:ext uri="{FF2B5EF4-FFF2-40B4-BE49-F238E27FC236}">
+                <a16:creationId xmlns:a16="http://schemas.microsoft.com/office/drawing/2014/main" id="{A3335EA0-8048-43E1-B3CF-5A9E78482646}"/>
+              </a:ext>
+            </a:extLst>
+          </p:cNvPr>
+          <p:cNvSpPr>
+            <a:spLocks noGrp="1"/>
+          </p:cNvSpPr>
+          <p:nvPr>
+            <p:ph type="body" sz="quarter" idx="10"/>
+          </p:nvPr>
+        </p:nvSpPr>
+        <p:spPr>
+          <a:xfrm>
+            <a:off x="1" y="344260"/>
+            <a:ext cx="12191999" cy="2585323"/>
+          </a:xfrm>
+        </p:spPr>
+        <p:txBody>
+          <a:bodyPr wrap="square">
+            <a:spAutoFit/>
+          </a:bodyPr>
+          <a:lstStyle>
+            <a:lvl1pPr marL="0" indent="0" algn="ctr">
+              <a:buNone/>
+              <a:defRPr sz="18000" b="1">
+                <a:solidFill>
+                  <a:srgbClr val="FFFF00"/>
+                </a:solidFill>
+              </a:defRPr>
+            </a:lvl1pPr>
+            <a:lvl2pPr>
+              <a:defRPr b="1">
+                <a:solidFill>
+                  <a:srgbClr val="FFFF00"/>
+                </a:solidFill>
+              </a:defRPr>
+            </a:lvl2pPr>
+            <a:lvl3pPr>
+              <a:defRPr b="1">
+                <a:solidFill>
+                  <a:srgbClr val="FFFF00"/>
+                </a:solidFill>
+              </a:defRPr>
+            </a:lvl3pPr>
+            <a:lvl4pPr>
+              <a:defRPr b="1">
+                <a:solidFill>
+                  <a:srgbClr val="FFFF00"/>
+                </a:solidFill>
+              </a:defRPr>
+            </a:lvl4pPr>
+            <a:lvl5pPr>
+              <a:defRPr b="1">
+                <a:solidFill>
+                  <a:srgbClr val="FFFF00"/>
+                </a:solidFill>
+              </a:defRPr>
+            </a:lvl5pPr>
+          </a:lstStyle>
+          <a:p>
+            <a:pPr lvl="0"/>
+            <a:endParaRPr lang="ko-KR" altLang="en-US" dirty="0"/>
+          </a:p>
+        </p:txBody>
+      </p:sp>
+      <p:sp>
+        <p:nvSpPr>
+          <p:cNvPr id="4" name="TextBox 3">
+            <a:extLst>
+              <a:ext uri="{FF2B5EF4-FFF2-40B4-BE49-F238E27FC236}">
+                <a16:creationId xmlns:a16="http://schemas.microsoft.com/office/drawing/2014/main" id="{239D78A6-9A1E-44C2-9A04-08A93132638F}"/>
+              </a:ext>
+            </a:extLst>
+          </p:cNvPr>
+          <p:cNvSpPr txBox="1"/>
+          <p:nvPr userDrawn="1"/>
+        </p:nvSpPr>
+        <p:spPr>
+          <a:xfrm>
+            <a:off x="-122209" y="3279802"/>
+            <a:ext cx="12436418" cy="1569660"/>
+          </a:xfrm>
+          <a:prstGeom prst="rect">
+            <a:avLst/>
+          </a:prstGeom>
+          <a:noFill/>
+        </p:spPr>
+        <p:txBody>
+          <a:bodyPr wrap="none" rtlCol="0">
+            <a:spAutoFit/>
+          </a:bodyPr>
+          <a:lstStyle/>
+          <a:p>
+            <a:r>
+              <a:rPr lang="en-US" altLang="ko-KR" sz="9600" b="1" dirty="0">
+                <a:solidFill>
+                  <a:srgbClr val="FF0000"/>
+                </a:solidFill>
+              </a:rPr>
+              <a:t>How many syllables?</a:t>
+            </a:r>
+            <a:endParaRPr lang="ko-KR" altLang="en-US" sz="9600" b="1" dirty="0">
+              <a:solidFill>
+                <a:srgbClr val="FF0000"/>
+              </a:solidFill>
+            </a:endParaRPr>
+          </a:p>
+        </p:txBody>
+      </p:sp>
+      <p:sp>
+        <p:nvSpPr>
+          <p:cNvPr id="5" name="텍스트 개체 틀 3">
+            <a:extLst>
+              <a:ext uri="{FF2B5EF4-FFF2-40B4-BE49-F238E27FC236}">
+                <a16:creationId xmlns:a16="http://schemas.microsoft.com/office/drawing/2014/main" id="{A8309468-ABDB-4017-8577-DD1309389735}"/>
+              </a:ext>
+            </a:extLst>
+          </p:cNvPr>
+          <p:cNvSpPr>
+            <a:spLocks noGrp="1"/>
+          </p:cNvSpPr>
+          <p:nvPr>
+            <p:ph type="body" sz="quarter" idx="11"/>
+          </p:nvPr>
+        </p:nvSpPr>
+        <p:spPr>
+          <a:xfrm>
+            <a:off x="1" y="343350"/>
+            <a:ext cx="12191999" cy="2585323"/>
+          </a:xfrm>
+        </p:spPr>
+        <p:txBody>
+          <a:bodyPr wrap="square">
+            <a:spAutoFit/>
+          </a:bodyPr>
+          <a:lstStyle>
+            <a:lvl1pPr marL="0" indent="0" algn="ctr">
+              <a:buNone/>
+              <a:defRPr sz="18000" b="1">
+                <a:solidFill>
+                  <a:srgbClr val="FFFF00"/>
+                </a:solidFill>
+              </a:defRPr>
+            </a:lvl1pPr>
+            <a:lvl2pPr>
+              <a:defRPr b="1">
+                <a:solidFill>
+                  <a:srgbClr val="FFFF00"/>
+                </a:solidFill>
+              </a:defRPr>
+            </a:lvl2pPr>
+            <a:lvl3pPr>
+              <a:defRPr b="1">
+                <a:solidFill>
+                  <a:srgbClr val="FFFF00"/>
+                </a:solidFill>
+              </a:defRPr>
+            </a:lvl3pPr>
+            <a:lvl4pPr>
+              <a:defRPr b="1">
+                <a:solidFill>
+                  <a:srgbClr val="FFFF00"/>
+                </a:solidFill>
+              </a:defRPr>
+            </a:lvl4pPr>
+            <a:lvl5pPr>
+              <a:defRPr b="1">
+                <a:solidFill>
+                  <a:srgbClr val="FFFF00"/>
+                </a:solidFill>
+              </a:defRPr>
+            </a:lvl5pPr>
+          </a:lstStyle>
+          <a:p>
+            <a:pPr lvl="0"/>
+            <a:endParaRPr lang="ko-KR" altLang="en-US" dirty="0"/>
+          </a:p>
+        </p:txBody>
+      </p:sp>
+      <p:sp>
+        <p:nvSpPr>
+          <p:cNvPr id="7" name="텍스트 개체 틀 2">
+            <a:extLst>
+              <a:ext uri="{FF2B5EF4-FFF2-40B4-BE49-F238E27FC236}">
+                <a16:creationId xmlns:a16="http://schemas.microsoft.com/office/drawing/2014/main" id="{2E575AF5-1A6A-4B16-907C-573456D0383C}"/>
+              </a:ext>
+            </a:extLst>
+          </p:cNvPr>
+          <p:cNvSpPr>
+            <a:spLocks noGrp="1"/>
+          </p:cNvSpPr>
+          <p:nvPr>
+            <p:ph type="body" sz="quarter" idx="12"/>
+          </p:nvPr>
+        </p:nvSpPr>
+        <p:spPr>
+          <a:xfrm>
+            <a:off x="-1" y="4962808"/>
+            <a:ext cx="12192001" cy="1685077"/>
+          </a:xfrm>
+        </p:spPr>
+        <p:txBody>
+          <a:bodyPr wrap="square">
+            <a:spAutoFit/>
+          </a:bodyPr>
+          <a:lstStyle>
+            <a:lvl1pPr marL="0" indent="0" algn="ctr">
+              <a:buNone/>
+              <a:defRPr sz="11500" b="1">
+                <a:solidFill>
+                  <a:srgbClr val="FF0000"/>
+                </a:solidFill>
+              </a:defRPr>
+            </a:lvl1pPr>
+          </a:lstStyle>
+          <a:p>
+            <a:pPr lvl="0"/>
+            <a:endParaRPr lang="ko-KR" altLang="en-US" dirty="0"/>
+          </a:p>
+        </p:txBody>
+      </p:sp>
+    </p:spTree>
+    <p:extLst>
+      <p:ext uri="{BB962C8B-B14F-4D97-AF65-F5344CB8AC3E}">
+        <p14:creationId xmlns:p14="http://schemas.microsoft.com/office/powerpoint/2010/main" val="2211104697"/>
+      </p:ext>
+    </p:extLst>
+  </p:cSld>
+  <p:clrMapOvr>
+    <a:overrideClrMapping bg1="dk1" tx1="lt1" bg2="dk2" tx2="lt2" accent1="accent1" accent2="accent2" accent3="accent3" accent4="accent4" accent5="accent5" accent6="accent6" hlink="hlink" folHlink="folHlink"/>
+  </p:clrMapOvr>
+  <mc:AlternateContent xmlns:mc="http://schemas.openxmlformats.org/markup-compatibility/2006">
+    <mc:Choice xmlns:p14="http://schemas.microsoft.com/office/powerpoint/2010/main" Requires="p14">
+      <p:transition p14:dur="10" advClick="0"/>
+    </mc:Choice>
+    <mc:Fallback>
+      <p:transition advClick="0"/>
+    </mc:Fallback>
+  </mc:AlternateContent>
+  <p:timing>
+    <p:tnLst>
+      <p:par>
+        <p:cTn id="1" dur="indefinite" restart="never" nodeType="tmRoot">
+          <p:childTnLst>
+            <p:seq concurrent="1" nextAc="seek">
+              <p:cTn id="2" dur="indefinite" nodeType="mainSeq">
+                <p:childTnLst>
+                  <p:par>
+                    <p:cTn id="3" fill="hold">
+                      <p:stCondLst>
+                        <p:cond delay="indefinite"/>
+                      </p:stCondLst>
+                      <p:childTnLst>
+                        <p:par>
+                          <p:cTn id="4" fill="hold">
+                            <p:stCondLst>
+                              <p:cond delay="0"/>
+                            </p:stCondLst>
+                            <p:childTnLst>
+                              <p:par>
+                                <p:cTn id="5" presetID="10" presetClass="exit" presetSubtype="0" fill="hold" grpId="0" nodeType="clickEffect" nodePh="1">
+                                  <p:stCondLst>
+                                    <p:cond delay="0"/>
+                                  </p:stCondLst>
+                                  <p:endCondLst>
+                                    <p:cond evt="begin" delay="0">
+                                      <p:tn val="5"/>
+                                    </p:cond>
+                                  </p:endCondLst>
+                                  <p:childTnLst>
+                                    <p:animEffect transition="out" filter="fade">
+                                      <p:cBhvr>
+                                        <p:cTn id="6" dur="500"/>
+                                        <p:tgtEl>
+                                          <p:spTgt spid="2">
+                                            <p:txEl>
+                                              <p:pRg st="0" end="0"/>
+                                            </p:txEl>
+                                          </p:spTgt>
+                                        </p:tgtEl>
+                                      </p:cBhvr>
+                                    </p:animEffect>
+                                    <p:set>
+                                      <p:cBhvr>
+                                        <p:cTn id="7" dur="1" fill="hold">
+                                          <p:stCondLst>
+                                            <p:cond delay="499"/>
+                                          </p:stCondLst>
+                                        </p:cTn>
+                                        <p:tgtEl>
+                                          <p:spTgt spid="2">
+                                            <p:txEl>
+                                              <p:pRg st="0" end="0"/>
+                                            </p:txEl>
+                                          </p:spTgt>
+                                        </p:tgtEl>
+                                        <p:attrNameLst>
+                                          <p:attrName>style.visibility</p:attrName>
+                                        </p:attrNameLst>
+                                      </p:cBhvr>
+                                      <p:to>
+                                        <p:strVal val="hidden"/>
+                                      </p:to>
+                                    </p:set>
+                                  </p:childTnLst>
+                                </p:cTn>
+                              </p:par>
+                            </p:childTnLst>
+                          </p:cTn>
+                        </p:par>
+                        <p:par>
+                          <p:cTn id="8" fill="hold">
+                            <p:stCondLst>
+                              <p:cond delay="500"/>
+                            </p:stCondLst>
+                            <p:childTnLst>
+                              <p:par>
+                                <p:cTn id="9" presetID="10" presetClass="entr" presetSubtype="0" fill="hold" grpId="0" nodeType="afterEffect" nodePh="1">
+                                  <p:stCondLst>
+                                    <p:cond delay="0"/>
+                                  </p:stCondLst>
+                                  <p:endCondLst>
+                                    <p:cond evt="begin" delay="0">
+                                      <p:tn val="9"/>
+                                    </p:cond>
+                                  </p:endCondLst>
+                                  <p:childTnLst>
+                                    <p:set>
+                                      <p:cBhvr>
+                                        <p:cTn id="10" dur="1" fill="hold">
+                                          <p:stCondLst>
+                                            <p:cond delay="0"/>
+                                          </p:stCondLst>
+                                        </p:cTn>
+                                        <p:tgtEl>
+                                          <p:spTgt spid="5">
+                                            <p:txEl>
+                                              <p:pRg st="0" end="0"/>
+                                            </p:txEl>
+                                          </p:spTgt>
+                                        </p:tgtEl>
+                                        <p:attrNameLst>
+                                          <p:attrName>style.visibility</p:attrName>
+                                        </p:attrNameLst>
+                                      </p:cBhvr>
+                                      <p:to>
+                                        <p:strVal val="visible"/>
+                                      </p:to>
+                                    </p:set>
+                                    <p:animEffect transition="in" filter="fade">
+                                      <p:cBhvr>
+                                        <p:cTn id="11" dur="500"/>
+                                        <p:tgtEl>
+                                          <p:spTgt spid="5">
+                                            <p:txEl>
+                                              <p:pRg st="0" end="0"/>
+                                            </p:txEl>
+                                          </p:spTgt>
+                                        </p:tgtEl>
+                                      </p:cBhvr>
+                                    </p:animEffect>
+                                  </p:childTnLst>
+                                </p:cTn>
+                              </p:par>
+                              <p:par>
+                                <p:cTn id="12" presetID="10" presetClass="entr" presetSubtype="0" fill="hold" grpId="0" nodeType="withEffect" nodePh="1">
+                                  <p:stCondLst>
+                                    <p:cond delay="0"/>
+                                  </p:stCondLst>
+                                  <p:endCondLst>
+                                    <p:cond evt="begin" delay="0">
+                                      <p:tn val="12"/>
+                                    </p:cond>
+                                  </p:endCondLst>
+                                  <p:childTnLst>
+                                    <p:set>
+                                      <p:cBhvr>
+                                        <p:cTn id="13" dur="1" fill="hold">
+                                          <p:stCondLst>
+                                            <p:cond delay="0"/>
+                                          </p:stCondLst>
+                                        </p:cTn>
+                                        <p:tgtEl>
+                                          <p:spTgt spid="7">
+                                            <p:txEl>
+                                              <p:pRg st="0" end="0"/>
+                                            </p:txEl>
+                                          </p:spTgt>
+                                        </p:tgtEl>
+                                        <p:attrNameLst>
+                                          <p:attrName>style.visibility</p:attrName>
+                                        </p:attrNameLst>
+                                      </p:cBhvr>
+                                      <p:to>
+                                        <p:strVal val="visible"/>
+                                      </p:to>
+                                    </p:set>
+                                    <p:animEffect transition="in" filter="fade">
+                                      <p:cBhvr>
+                                        <p:cTn id="14" dur="500"/>
+                                        <p:tgtEl>
+                                          <p:spTgt spid="7">
+                                            <p:txEl>
+                                              <p:pRg st="0" end="0"/>
+                                            </p:txEl>
+                                          </p:spTgt>
+                                        </p:tgtEl>
+                                      </p:cBhvr>
+                                    </p:animEffect>
+                                  </p:childTnLst>
+                                </p:cTn>
+                              </p:par>
+                            </p:childTnLst>
+                          </p:cTn>
+                        </p:par>
+                      </p:childTnLst>
+                    </p:cTn>
+                  </p:par>
+                </p:childTnLst>
+              </p:cTn>
+              <p:prevCondLst>
+                <p:cond evt="onPrev" delay="0">
+                  <p:tgtEl>
+                    <p:sldTgt/>
+                  </p:tgtEl>
+                </p:cond>
+              </p:prevCondLst>
+              <p:nextCondLst>
+                <p:cond evt="onNext" delay="0">
+                  <p:tgtEl>
+                    <p:sldTgt/>
+                  </p:tgtEl>
+                </p:cond>
+              </p:nextCondLst>
+            </p:seq>
+          </p:childTnLst>
+        </p:cTn>
+      </p:par>
+    </p:tnLst>
+    <p:bldLst>
+      <p:bldP spid="2" grpId="0" build="p">
+        <p:tmplLst>
+          <p:tmpl lvl="1">
+            <p:tnLst>
+              <p:par>
+                <p:cTn presetID="10" presetClass="exit" presetSubtype="0" fill="hold" nodeType="clickEffect" nodePh="1">
+                  <p:stCondLst>
+                    <p:cond delay="0"/>
+                  </p:stCondLst>
+                  <p:endCondLst>
+                    <p:cond/>
+                  </p:endCondLst>
+                  <p:childTnLst>
+                    <p:animEffect transition="out" filter="fade">
+                      <p:cBhvr>
+                        <p:cTn dur="500"/>
+                        <p:tgtEl>
+                          <p:spTgt spid="2"/>
+                        </p:tgtEl>
+                      </p:cBhvr>
+                    </p:animEffect>
+                    <p:set>
+                      <p:cBhvr>
+                        <p:cTn dur="1" fill="hold">
+                          <p:stCondLst>
+                            <p:cond delay="499"/>
+                          </p:stCondLst>
+                        </p:cTn>
+                        <p:tgtEl>
+                          <p:spTgt spid="2"/>
+                        </p:tgtEl>
+                        <p:attrNameLst>
+                          <p:attrName>style.visibility</p:attrName>
+                        </p:attrNameLst>
+                      </p:cBhvr>
+                      <p:to>
+                        <p:strVal val="hidden"/>
+                      </p:to>
+                    </p:set>
+                  </p:childTnLst>
+                </p:cTn>
+              </p:par>
+            </p:tnLst>
+          </p:tmpl>
+        </p:tmplLst>
+      </p:bldP>
+      <p:bldP spid="5" grpId="0" build="p">
+        <p:tmplLst>
+          <p:tmpl lvl="1">
+            <p:tnLst>
+              <p:par>
+                <p:cTn presetID="10" presetClass="entr" presetSubtype="0" fill="hold" nodeType="afterEffect" nodePh="1">
+                  <p:stCondLst>
+                    <p:cond delay="0"/>
+                  </p:stCondLst>
+                  <p:endCondLst>
+                    <p:cond/>
+                  </p:endCondLst>
+                  <p:childTnLst>
+                    <p:set>
+                      <p:cBhvr>
+                        <p:cTn dur="1" fill="hold">
+                          <p:stCondLst>
+                            <p:cond delay="0"/>
+                          </p:stCondLst>
+                        </p:cTn>
+                        <p:tgtEl>
+                          <p:spTgt spid="5"/>
+                        </p:tgtEl>
+                        <p:attrNameLst>
+                          <p:attrName>style.visibility</p:attrName>
+                        </p:attrNameLst>
+                      </p:cBhvr>
+                      <p:to>
+                        <p:strVal val="visible"/>
+                      </p:to>
+                    </p:set>
+                    <p:animEffect transition="in" filter="fade">
+                      <p:cBhvr>
+                        <p:cTn dur="500"/>
+                        <p:tgtEl>
+                          <p:spTgt spid="5"/>
+                        </p:tgtEl>
+                      </p:cBhvr>
+                    </p:animEffect>
+                  </p:childTnLst>
+                </p:cTn>
+              </p:par>
+            </p:tnLst>
+          </p:tmpl>
+        </p:tmplLst>
+      </p:bldP>
+      <p:bldP spid="7" grpId="0" build="p">
+        <p:tmplLst>
+          <p:tmpl lvl="1">
+            <p:tnLst>
+              <p:par>
+                <p:cTn presetID="10" presetClass="entr" presetSubtype="0" fill="hold" nodeType="withEffect" nodePh="1">
+                  <p:stCondLst>
+                    <p:cond delay="0"/>
+                  </p:stCondLst>
+                  <p:endCondLst>
+                    <p:cond/>
+                  </p:endCondLst>
+                  <p:childTnLst>
+                    <p:set>
+                      <p:cBhvr>
+                        <p:cTn dur="1" fill="hold">
+                          <p:stCondLst>
+                            <p:cond delay="0"/>
+                          </p:stCondLst>
+                        </p:cTn>
+                        <p:tgtEl>
+                          <p:spTgt spid="7"/>
+                        </p:tgtEl>
+                        <p:attrNameLst>
+                          <p:attrName>style.visibility</p:attrName>
+                        </p:attrNameLst>
+                      </p:cBhvr>
+                      <p:to>
+                        <p:strVal val="visible"/>
+                      </p:to>
+                    </p:set>
+                    <p:animEffect transition="in" filter="fade">
+                      <p:cBhvr>
+                        <p:cTn dur="500"/>
+                        <p:tgtEl>
+                          <p:spTgt spid="7"/>
+                        </p:tgtEl>
+                      </p:cBhvr>
+                    </p:animEffect>
+                  </p:childTnLst>
+                </p:cTn>
+              </p:par>
+            </p:tnLst>
+          </p:tmpl>
+        </p:tmplLst>
+      </p:bldP>
+    </p:bldLst>
+  </p:timing>
+</p:sldLayout>
+</file>
+
+<file path=ppt/slideLayouts/slideLayout7.xml><?xml version="1.0" encoding="utf-8"?>
+<p:sldLayout xmlns:a="http://schemas.openxmlformats.org/drawingml/2006/main" xmlns:r="http://schemas.openxmlformats.org/officeDocument/2006/relationships" xmlns:p="http://schemas.openxmlformats.org/presentationml/2006/main" preserve="1" userDrawn="1">
   <p:cSld name="4_사용자 지정 레이아웃">
     <p:bg>
       <p:bgRef idx="1001">
@@ -815,10 +1620,10 @@
               <a:defRPr/>
             </a:pPr>
             <a:r>
-              <a:rPr lang="en-US" altLang="ko-KR" sz="11500" b="1" dirty="0" smtClean="0"/>
+              <a:rPr lang="en-US" altLang="ko-KR" sz="11500" b="1" dirty="0"/>
               <a:t>Say in Korean</a:t>
             </a:r>
-            <a:endParaRPr lang="ko-KR" altLang="en-US" sz="11500" b="1" dirty="0" smtClean="0"/>
+            <a:endParaRPr lang="ko-KR" altLang="en-US" sz="11500" b="1" dirty="0"/>
           </a:p>
         </p:txBody>
       </p:sp>
@@ -832,32 +1637,18 @@
   <p:clrMapOvr>
     <a:overrideClrMapping bg1="dk1" tx1="lt1" bg2="dk2" tx2="lt2" accent1="accent1" accent2="accent2" accent3="accent3" accent4="accent4" accent5="accent5" accent6="accent6" hlink="hlink" folHlink="folHlink"/>
   </p:clrMapOvr>
-  <mc:AlternateContent xmlns:mc="http://schemas.openxmlformats.org/markup-compatibility/2006" xmlns:p14="http://schemas.microsoft.com/office/powerpoint/2010/main">
-    <mc:Choice Requires="p14">
-      <p:transition spd="med" p14:dur="700" advClick="0" advTm="1000">
-        <p:fade/>
-        <p:sndAc>
-          <p:stSnd>
-            <p:snd r:embed="rId1" name="click.wav"/>
-          </p:stSnd>
-        </p:sndAc>
-      </p:transition>
-    </mc:Choice>
-    <mc:Fallback xmlns="">
-      <p:transition spd="med" advClick="0" advTm="1000">
-        <p:fade/>
-        <p:sndAc>
-          <p:stSnd>
-            <p:snd r:embed="rId3" name="click.wav"/>
-          </p:stSnd>
-        </p:sndAc>
-      </p:transition>
-    </mc:Fallback>
-  </mc:AlternateContent>
+  <p:transition advClick="0" advTm="700">
+    <p:fade/>
+    <p:sndAc>
+      <p:stSnd>
+        <p:snd r:embed="rId1" name="whoosh.wav"/>
+      </p:stSnd>
+    </p:sndAc>
+  </p:transition>
 </p:sldLayout>
 </file>
 
-<file path=ppt/slideLayouts/slideLayout7.xml><?xml version="1.0" encoding="utf-8"?>
+<file path=ppt/slideLayouts/slideLayout8.xml><?xml version="1.0" encoding="utf-8"?>
 <p:sldLayout xmlns:a="http://schemas.openxmlformats.org/drawingml/2006/main" xmlns:r="http://schemas.openxmlformats.org/officeDocument/2006/relationships" xmlns:p="http://schemas.openxmlformats.org/presentationml/2006/main" preserve="1" userDrawn="1">
   <p:cSld name="7_사용자 지정 레이아웃">
     <p:bg>
@@ -919,7 +1710,7 @@
               <a:defRPr/>
             </a:pPr>
             <a:r>
-              <a:rPr lang="en-US" altLang="ko-KR" sz="11500" b="1" dirty="0" smtClean="0"/>
+              <a:rPr lang="en-US" altLang="ko-KR" sz="11500" b="1" dirty="0"/>
               <a:t>Say in English</a:t>
             </a:r>
           </a:p>
@@ -935,28 +1726,14 @@
   <p:clrMapOvr>
     <a:overrideClrMapping bg1="dk1" tx1="lt1" bg2="dk2" tx2="lt2" accent1="accent1" accent2="accent2" accent3="accent3" accent4="accent4" accent5="accent5" accent6="accent6" hlink="hlink" folHlink="folHlink"/>
   </p:clrMapOvr>
-  <mc:AlternateContent xmlns:mc="http://schemas.openxmlformats.org/markup-compatibility/2006" xmlns:p14="http://schemas.microsoft.com/office/powerpoint/2010/main">
-    <mc:Choice Requires="p14">
-      <p:transition spd="med" p14:dur="700" advClick="0" advTm="1000">
-        <p:fade/>
-        <p:sndAc>
-          <p:stSnd>
-            <p:snd r:embed="rId1" name="click.wav"/>
-          </p:stSnd>
-        </p:sndAc>
-      </p:transition>
-    </mc:Choice>
-    <mc:Fallback xmlns="">
-      <p:transition spd="med" advClick="0" advTm="1000">
-        <p:fade/>
-        <p:sndAc>
-          <p:stSnd>
-            <p:snd r:embed="rId3" name="click.wav"/>
-          </p:stSnd>
-        </p:sndAc>
-      </p:transition>
-    </mc:Fallback>
-  </mc:AlternateContent>
+  <p:transition advClick="0" advTm="700">
+    <p:fade/>
+    <p:sndAc>
+      <p:stSnd>
+        <p:snd r:embed="rId1" name="whoosh.wav"/>
+      </p:stSnd>
+    </p:sndAc>
+  </p:transition>
 </p:sldLayout>
 </file>
 
@@ -1128,7 +1905,7 @@
           <a:p>
             <a:fld id="{D880F4F0-8576-44C0-8B5A-9ED4C3446C61}" type="datetimeFigureOut">
               <a:rPr lang="ko-KR" altLang="en-US" smtClean="0"/>
-              <a:t>2018-10-17</a:t>
+              <a:t>2018. 10. 21.</a:t>
             </a:fld>
             <a:endParaRPr lang="ko-KR" altLang="en-US"/>
           </a:p>
@@ -1238,8 +2015,9 @@
     <p:sldLayoutId id="2147483652" r:id="rId3"/>
     <p:sldLayoutId id="2147483653" r:id="rId4"/>
     <p:sldLayoutId id="2147483656" r:id="rId5"/>
-    <p:sldLayoutId id="2147483657" r:id="rId6"/>
-    <p:sldLayoutId id="2147483658" r:id="rId7"/>
+    <p:sldLayoutId id="2147483659" r:id="rId6"/>
+    <p:sldLayoutId id="2147483657" r:id="rId7"/>
+    <p:sldLayoutId id="2147483658" r:id="rId8"/>
   </p:sldLayoutIdLst>
   <mc:AlternateContent xmlns:mc="http://schemas.openxmlformats.org/markup-compatibility/2006" xmlns:p14="http://schemas.microsoft.com/office/powerpoint/2010/main">
     <mc:Choice Requires="p14">
@@ -1247,7 +2025,7 @@
         <p:fade/>
         <p:sndAc>
           <p:stSnd>
-            <p:snd r:embed="rId9" name="click.wav"/>
+            <p:snd r:embed="rId10" name="click.wav"/>
           </p:stSnd>
         </p:sndAc>
       </p:transition>
@@ -1257,7 +2035,7 @@
         <p:fade/>
         <p:sndAc>
           <p:stSnd>
-            <p:snd r:embed="rId10" name="click.wav"/>
+            <p:snd r:embed="rId11" name="click.wav"/>
           </p:stSnd>
         </p:sndAc>
       </p:transition>
@@ -1932,4 +2710,299 @@
     </a:ext>
   </a:extLst>
 </a:theme>
+</file>
+
+<file path=ppt/theme/theme2.xml><?xml version="1.0" encoding="utf-8"?>
+<a:theme xmlns:a="http://schemas.openxmlformats.org/drawingml/2006/main" name="Office 테마">
+  <a:themeElements>
+    <a:clrScheme name="Office">
+      <a:dk1>
+        <a:sysClr val="windowText" lastClr="000000"/>
+      </a:dk1>
+      <a:lt1>
+        <a:sysClr val="window" lastClr="FFFFFF"/>
+      </a:lt1>
+      <a:dk2>
+        <a:srgbClr val="44546A"/>
+      </a:dk2>
+      <a:lt2>
+        <a:srgbClr val="E7E6E6"/>
+      </a:lt2>
+      <a:accent1>
+        <a:srgbClr val="4472C4"/>
+      </a:accent1>
+      <a:accent2>
+        <a:srgbClr val="ED7D31"/>
+      </a:accent2>
+      <a:accent3>
+        <a:srgbClr val="A5A5A5"/>
+      </a:accent3>
+      <a:accent4>
+        <a:srgbClr val="FFC000"/>
+      </a:accent4>
+      <a:accent5>
+        <a:srgbClr val="5B9BD5"/>
+      </a:accent5>
+      <a:accent6>
+        <a:srgbClr val="70AD47"/>
+      </a:accent6>
+      <a:hlink>
+        <a:srgbClr val="0563C1"/>
+      </a:hlink>
+      <a:folHlink>
+        <a:srgbClr val="954F72"/>
+      </a:folHlink>
+    </a:clrScheme>
+    <a:fontScheme name="Office">
+      <a:majorFont>
+        <a:latin typeface="맑은 고딕" panose="020F0302020204030204"/>
+        <a:ea typeface=""/>
+        <a:cs typeface=""/>
+        <a:font script="Jpan" typeface="游ゴシック Light"/>
+        <a:font script="Hang" typeface="맑은 고딕"/>
+        <a:font script="Hans" typeface="等线 Light"/>
+        <a:font script="Hant" typeface="新細明體"/>
+        <a:font script="Arab" typeface="Times New Roman"/>
+        <a:font script="Hebr" typeface="Times New Roman"/>
+        <a:font script="Thai" typeface="Angsana New"/>
+        <a:font script="Ethi" typeface="Nyala"/>
+        <a:font script="Beng" typeface="Vrinda"/>
+        <a:font script="Gujr" typeface="Shruti"/>
+        <a:font script="Khmr" typeface="MoolBoran"/>
+        <a:font script="Knda" typeface="Tunga"/>
+        <a:font script="Guru" typeface="Raavi"/>
+        <a:font script="Cans" typeface="Euphemia"/>
+        <a:font script="Cher" typeface="Plantagenet Cherokee"/>
+        <a:font script="Yiii" typeface="Microsoft Yi Baiti"/>
+        <a:font script="Tibt" typeface="Microsoft Himalaya"/>
+        <a:font script="Thaa" typeface="MV Boli"/>
+        <a:font script="Deva" typeface="Mangal"/>
+        <a:font script="Telu" typeface="Gautami"/>
+        <a:font script="Taml" typeface="Latha"/>
+        <a:font script="Syrc" typeface="Estrangelo Edessa"/>
+        <a:font script="Orya" typeface="Kalinga"/>
+        <a:font script="Mlym" typeface="Kartika"/>
+        <a:font script="Laoo" typeface="DokChampa"/>
+        <a:font script="Sinh" typeface="Iskoola Pota"/>
+        <a:font script="Mong" typeface="Mongolian Baiti"/>
+        <a:font script="Viet" typeface="Times New Roman"/>
+        <a:font script="Uigh" typeface="Microsoft Uighur"/>
+        <a:font script="Geor" typeface="Sylfaen"/>
+        <a:font script="Armn" typeface="Arial"/>
+        <a:font script="Bugi" typeface="Leelawadee UI"/>
+        <a:font script="Bopo" typeface="Microsoft JhengHei"/>
+        <a:font script="Java" typeface="Javanese Text"/>
+        <a:font script="Lisu" typeface="Segoe UI"/>
+        <a:font script="Mymr" typeface="Myanmar Text"/>
+        <a:font script="Nkoo" typeface="Ebrima"/>
+        <a:font script="Olck" typeface="Nirmala UI"/>
+        <a:font script="Osma" typeface="Ebrima"/>
+        <a:font script="Phag" typeface="Phagspa"/>
+        <a:font script="Syrn" typeface="Estrangelo Edessa"/>
+        <a:font script="Syrj" typeface="Estrangelo Edessa"/>
+        <a:font script="Syre" typeface="Estrangelo Edessa"/>
+        <a:font script="Sora" typeface="Nirmala UI"/>
+        <a:font script="Tale" typeface="Microsoft Tai Le"/>
+        <a:font script="Talu" typeface="Microsoft New Tai Lue"/>
+        <a:font script="Tfng" typeface="Ebrima"/>
+      </a:majorFont>
+      <a:minorFont>
+        <a:latin typeface="맑은 고딕" panose="020F0502020204030204"/>
+        <a:ea typeface=""/>
+        <a:cs typeface=""/>
+        <a:font script="Jpan" typeface="游ゴシック"/>
+        <a:font script="Hang" typeface="맑은 고딕"/>
+        <a:font script="Hans" typeface="等线"/>
+        <a:font script="Hant" typeface="新細明體"/>
+        <a:font script="Arab" typeface="Arial"/>
+        <a:font script="Hebr" typeface="Arial"/>
+        <a:font script="Thai" typeface="Cordia New"/>
+        <a:font script="Ethi" typeface="Nyala"/>
+        <a:font script="Beng" typeface="Vrinda"/>
+        <a:font script="Gujr" typeface="Shruti"/>
+        <a:font script="Khmr" typeface="DaunPenh"/>
+        <a:font script="Knda" typeface="Tunga"/>
+        <a:font script="Guru" typeface="Raavi"/>
+        <a:font script="Cans" typeface="Euphemia"/>
+        <a:font script="Cher" typeface="Plantagenet Cherokee"/>
+        <a:font script="Yiii" typeface="Microsoft Yi Baiti"/>
+        <a:font script="Tibt" typeface="Microsoft Himalaya"/>
+        <a:font script="Thaa" typeface="MV Boli"/>
+        <a:font script="Deva" typeface="Mangal"/>
+        <a:font script="Telu" typeface="Gautami"/>
+        <a:font script="Taml" typeface="Latha"/>
+        <a:font script="Syrc" typeface="Estrangelo Edessa"/>
+        <a:font script="Orya" typeface="Kalinga"/>
+        <a:font script="Mlym" typeface="Kartika"/>
+        <a:font script="Laoo" typeface="DokChampa"/>
+        <a:font script="Sinh" typeface="Iskoola Pota"/>
+        <a:font script="Mong" typeface="Mongolian Baiti"/>
+        <a:font script="Viet" typeface="Arial"/>
+        <a:font script="Uigh" typeface="Microsoft Uighur"/>
+        <a:font script="Geor" typeface="Sylfaen"/>
+        <a:font script="Armn" typeface="Arial"/>
+        <a:font script="Bugi" typeface="Leelawadee UI"/>
+        <a:font script="Bopo" typeface="Microsoft JhengHei"/>
+        <a:font script="Java" typeface="Javanese Text"/>
+        <a:font script="Lisu" typeface="Segoe UI"/>
+        <a:font script="Mymr" typeface="Myanmar Text"/>
+        <a:font script="Nkoo" typeface="Ebrima"/>
+        <a:font script="Olck" typeface="Nirmala UI"/>
+        <a:font script="Osma" typeface="Ebrima"/>
+        <a:font script="Phag" typeface="Phagspa"/>
+        <a:font script="Syrn" typeface="Estrangelo Edessa"/>
+        <a:font script="Syrj" typeface="Estrangelo Edessa"/>
+        <a:font script="Syre" typeface="Estrangelo Edessa"/>
+        <a:font script="Sora" typeface="Nirmala UI"/>
+        <a:font script="Tale" typeface="Microsoft Tai Le"/>
+        <a:font script="Talu" typeface="Microsoft New Tai Lue"/>
+        <a:font script="Tfng" typeface="Ebrima"/>
+      </a:minorFont>
+    </a:fontScheme>
+    <a:fmtScheme name="Office">
+      <a:fillStyleLst>
+        <a:solidFill>
+          <a:schemeClr val="phClr"/>
+        </a:solidFill>
+        <a:gradFill rotWithShape="1">
+          <a:gsLst>
+            <a:gs pos="0">
+              <a:schemeClr val="phClr">
+                <a:lumMod val="110000"/>
+                <a:satMod val="105000"/>
+                <a:tint val="67000"/>
+              </a:schemeClr>
+            </a:gs>
+            <a:gs pos="50000">
+              <a:schemeClr val="phClr">
+                <a:lumMod val="105000"/>
+                <a:satMod val="103000"/>
+                <a:tint val="73000"/>
+              </a:schemeClr>
+            </a:gs>
+            <a:gs pos="100000">
+              <a:schemeClr val="phClr">
+                <a:lumMod val="105000"/>
+                <a:satMod val="109000"/>
+                <a:tint val="81000"/>
+              </a:schemeClr>
+            </a:gs>
+          </a:gsLst>
+          <a:lin ang="5400000" scaled="0"/>
+        </a:gradFill>
+        <a:gradFill rotWithShape="1">
+          <a:gsLst>
+            <a:gs pos="0">
+              <a:schemeClr val="phClr">
+                <a:satMod val="103000"/>
+                <a:lumMod val="102000"/>
+                <a:tint val="94000"/>
+              </a:schemeClr>
+            </a:gs>
+            <a:gs pos="50000">
+              <a:schemeClr val="phClr">
+                <a:satMod val="110000"/>
+                <a:lumMod val="100000"/>
+                <a:shade val="100000"/>
+              </a:schemeClr>
+            </a:gs>
+            <a:gs pos="100000">
+              <a:schemeClr val="phClr">
+                <a:lumMod val="99000"/>
+                <a:satMod val="120000"/>
+                <a:shade val="78000"/>
+              </a:schemeClr>
+            </a:gs>
+          </a:gsLst>
+          <a:lin ang="5400000" scaled="0"/>
+        </a:gradFill>
+      </a:fillStyleLst>
+      <a:lnStyleLst>
+        <a:ln w="6350" cap="flat" cmpd="sng" algn="ctr">
+          <a:solidFill>
+            <a:schemeClr val="phClr"/>
+          </a:solidFill>
+          <a:prstDash val="solid"/>
+          <a:miter lim="800000"/>
+        </a:ln>
+        <a:ln w="12700" cap="flat" cmpd="sng" algn="ctr">
+          <a:solidFill>
+            <a:schemeClr val="phClr"/>
+          </a:solidFill>
+          <a:prstDash val="solid"/>
+          <a:miter lim="800000"/>
+        </a:ln>
+        <a:ln w="19050" cap="flat" cmpd="sng" algn="ctr">
+          <a:solidFill>
+            <a:schemeClr val="phClr"/>
+          </a:solidFill>
+          <a:prstDash val="solid"/>
+          <a:miter lim="800000"/>
+        </a:ln>
+      </a:lnStyleLst>
+      <a:effectStyleLst>
+        <a:effectStyle>
+          <a:effectLst/>
+        </a:effectStyle>
+        <a:effectStyle>
+          <a:effectLst/>
+        </a:effectStyle>
+        <a:effectStyle>
+          <a:effectLst>
+            <a:outerShdw blurRad="57150" dist="19050" dir="5400000" algn="ctr" rotWithShape="0">
+              <a:srgbClr val="000000">
+                <a:alpha val="63000"/>
+              </a:srgbClr>
+            </a:outerShdw>
+          </a:effectLst>
+        </a:effectStyle>
+      </a:effectStyleLst>
+      <a:bgFillStyleLst>
+        <a:solidFill>
+          <a:schemeClr val="phClr"/>
+        </a:solidFill>
+        <a:solidFill>
+          <a:schemeClr val="phClr">
+            <a:tint val="95000"/>
+            <a:satMod val="170000"/>
+          </a:schemeClr>
+        </a:solidFill>
+        <a:gradFill rotWithShape="1">
+          <a:gsLst>
+            <a:gs pos="0">
+              <a:schemeClr val="phClr">
+                <a:tint val="93000"/>
+                <a:satMod val="150000"/>
+                <a:shade val="98000"/>
+                <a:lumMod val="102000"/>
+              </a:schemeClr>
+            </a:gs>
+            <a:gs pos="50000">
+              <a:schemeClr val="phClr">
+                <a:tint val="98000"/>
+                <a:satMod val="130000"/>
+                <a:shade val="90000"/>
+                <a:lumMod val="103000"/>
+              </a:schemeClr>
+            </a:gs>
+            <a:gs pos="100000">
+              <a:schemeClr val="phClr">
+                <a:shade val="63000"/>
+                <a:satMod val="120000"/>
+              </a:schemeClr>
+            </a:gs>
+          </a:gsLst>
+          <a:lin ang="5400000" scaled="0"/>
+        </a:gradFill>
+      </a:bgFillStyleLst>
+    </a:fmtScheme>
+  </a:themeElements>
+  <a:objectDefaults/>
+  <a:extraClrSchemeLst/>
+  <a:extLst>
+    <a:ext uri="{05A4C25C-085E-4340-85A3-A5531E510DB2}">
+      <thm15:themeFamily xmlns:thm15="http://schemas.microsoft.com/office/thememl/2012/main" name="Office Theme" id="{62F939B6-93AF-4DB8-9C6B-D6C7DFDC589F}" vid="{4A3C46E8-61CC-4603-A589-7422A47A8E4A}"/>
+    </a:ext>
+  </a:extLst>
+</a:theme>
 </file>
</xml_diff>

<commit_message>
adjusted the location of word
</commit_message>
<xml_diff>
--- a/template_for_word_flicker.pptx
+++ b/template_for_word_flicker.pptx
@@ -212,7 +212,7 @@
           <a:p>
             <a:fld id="{A40184D9-6173-44A3-AE7E-1195643E92F2}" type="datetimeFigureOut">
               <a:rPr lang="ko-KR" altLang="en-US" smtClean="0"/>
-              <a:t>2018. 10. 21.</a:t>
+              <a:t>2019. 1. 22.</a:t>
             </a:fld>
             <a:endParaRPr lang="ko-KR" altLang="en-US"/>
           </a:p>
@@ -377,7 +377,7 @@
         </p:nvSpPr>
         <p:spPr>
           <a:xfrm>
-            <a:off x="0" y="15511"/>
+            <a:off x="0" y="64788"/>
             <a:ext cx="12191999" cy="1698927"/>
           </a:xfrm>
         </p:spPr>
@@ -547,7 +547,7 @@
         </p:nvSpPr>
         <p:spPr>
           <a:xfrm>
-            <a:off x="0" y="-145915"/>
+            <a:off x="0" y="73101"/>
             <a:ext cx="12191999" cy="2017475"/>
           </a:xfrm>
         </p:spPr>
@@ -1206,11 +1206,11 @@
   <p:clrMapOvr>
     <a:overrideClrMapping bg1="dk1" tx1="lt1" bg2="dk2" tx2="lt2" accent1="accent1" accent2="accent2" accent3="accent3" accent4="accent4" accent5="accent5" accent6="accent6" hlink="hlink" folHlink="folHlink"/>
   </p:clrMapOvr>
-  <mc:AlternateContent xmlns:mc="http://schemas.openxmlformats.org/markup-compatibility/2006">
-    <mc:Choice xmlns:p14="http://schemas.microsoft.com/office/powerpoint/2010/main" Requires="p14">
+  <mc:AlternateContent xmlns:mc="http://schemas.openxmlformats.org/markup-compatibility/2006" xmlns:p14="http://schemas.microsoft.com/office/powerpoint/2010/main">
+    <mc:Choice Requires="p14">
       <p:transition p14:dur="10" advClick="0"/>
     </mc:Choice>
-    <mc:Fallback>
+    <mc:Fallback xmlns="">
       <p:transition advClick="0"/>
     </mc:Fallback>
   </mc:AlternateContent>
@@ -1425,7 +1425,7 @@
                     <p:cond delay="0"/>
                   </p:stCondLst>
                   <p:endCondLst>
-                    <p:cond/>
+                    <p:cond delay="0"/>
                   </p:endCondLst>
                   <p:childTnLst>
                     <p:animEffect transition="out" filter="fade">
@@ -1471,7 +1471,7 @@
                     <p:cond delay="0"/>
                   </p:stCondLst>
                   <p:endCondLst>
-                    <p:cond/>
+                    <p:cond delay="0"/>
                   </p:endCondLst>
                   <p:childTnLst>
                     <p:set>
@@ -1517,7 +1517,7 @@
                     <p:cond delay="0"/>
                   </p:stCondLst>
                   <p:endCondLst>
-                    <p:cond/>
+                    <p:cond delay="0"/>
                   </p:endCondLst>
                   <p:childTnLst>
                     <p:set>
@@ -1905,7 +1905,7 @@
           <a:p>
             <a:fld id="{D880F4F0-8576-44C0-8B5A-9ED4C3446C61}" type="datetimeFigureOut">
               <a:rPr lang="ko-KR" altLang="en-US" smtClean="0"/>
-              <a:t>2018. 10. 21.</a:t>
+              <a:t>2019. 1. 22.</a:t>
             </a:fld>
             <a:endParaRPr lang="ko-KR" altLang="en-US"/>
           </a:p>

</xml_diff>